<commit_message>
updated graphs based on 2308 citations
</commit_message>
<xml_diff>
--- a/outputs/legend_conf_paper.pptx
+++ b/outputs/legend_conf_paper.pptx
@@ -304,7 +304,7 @@
           <a:p>
             <a:fld id="{6BA5D40C-A8DC-479A-A5D3-E7B4936A184B}" type="datetimeFigureOut">
               <a:rPr lang="en-GB" smtClean="0"/>
-              <a:t>04/05/2020</a:t>
+              <a:t>07/07/2020</a:t>
             </a:fld>
             <a:endParaRPr lang="en-GB"/>
           </a:p>
@@ -474,7 +474,7 @@
           <a:p>
             <a:fld id="{6BA5D40C-A8DC-479A-A5D3-E7B4936A184B}" type="datetimeFigureOut">
               <a:rPr lang="en-GB" smtClean="0"/>
-              <a:t>04/05/2020</a:t>
+              <a:t>07/07/2020</a:t>
             </a:fld>
             <a:endParaRPr lang="en-GB"/>
           </a:p>
@@ -654,7 +654,7 @@
           <a:p>
             <a:fld id="{6BA5D40C-A8DC-479A-A5D3-E7B4936A184B}" type="datetimeFigureOut">
               <a:rPr lang="en-GB" smtClean="0"/>
-              <a:t>04/05/2020</a:t>
+              <a:t>07/07/2020</a:t>
             </a:fld>
             <a:endParaRPr lang="en-GB"/>
           </a:p>
@@ -824,7 +824,7 @@
           <a:p>
             <a:fld id="{6BA5D40C-A8DC-479A-A5D3-E7B4936A184B}" type="datetimeFigureOut">
               <a:rPr lang="en-GB" smtClean="0"/>
-              <a:t>04/05/2020</a:t>
+              <a:t>07/07/2020</a:t>
             </a:fld>
             <a:endParaRPr lang="en-GB"/>
           </a:p>
@@ -1070,7 +1070,7 @@
           <a:p>
             <a:fld id="{6BA5D40C-A8DC-479A-A5D3-E7B4936A184B}" type="datetimeFigureOut">
               <a:rPr lang="en-GB" smtClean="0"/>
-              <a:t>04/05/2020</a:t>
+              <a:t>07/07/2020</a:t>
             </a:fld>
             <a:endParaRPr lang="en-GB"/>
           </a:p>
@@ -1358,7 +1358,7 @@
           <a:p>
             <a:fld id="{6BA5D40C-A8DC-479A-A5D3-E7B4936A184B}" type="datetimeFigureOut">
               <a:rPr lang="en-GB" smtClean="0"/>
-              <a:t>04/05/2020</a:t>
+              <a:t>07/07/2020</a:t>
             </a:fld>
             <a:endParaRPr lang="en-GB"/>
           </a:p>
@@ -1785,7 +1785,7 @@
           <a:p>
             <a:fld id="{6BA5D40C-A8DC-479A-A5D3-E7B4936A184B}" type="datetimeFigureOut">
               <a:rPr lang="en-GB" smtClean="0"/>
-              <a:t>04/05/2020</a:t>
+              <a:t>07/07/2020</a:t>
             </a:fld>
             <a:endParaRPr lang="en-GB"/>
           </a:p>
@@ -1903,7 +1903,7 @@
           <a:p>
             <a:fld id="{6BA5D40C-A8DC-479A-A5D3-E7B4936A184B}" type="datetimeFigureOut">
               <a:rPr lang="en-GB" smtClean="0"/>
-              <a:t>04/05/2020</a:t>
+              <a:t>07/07/2020</a:t>
             </a:fld>
             <a:endParaRPr lang="en-GB"/>
           </a:p>
@@ -1998,7 +1998,7 @@
           <a:p>
             <a:fld id="{6BA5D40C-A8DC-479A-A5D3-E7B4936A184B}" type="datetimeFigureOut">
               <a:rPr lang="en-GB" smtClean="0"/>
-              <a:t>04/05/2020</a:t>
+              <a:t>07/07/2020</a:t>
             </a:fld>
             <a:endParaRPr lang="en-GB"/>
           </a:p>
@@ -2275,7 +2275,7 @@
           <a:p>
             <a:fld id="{6BA5D40C-A8DC-479A-A5D3-E7B4936A184B}" type="datetimeFigureOut">
               <a:rPr lang="en-GB" smtClean="0"/>
-              <a:t>04/05/2020</a:t>
+              <a:t>07/07/2020</a:t>
             </a:fld>
             <a:endParaRPr lang="en-GB"/>
           </a:p>
@@ -2528,7 +2528,7 @@
           <a:p>
             <a:fld id="{6BA5D40C-A8DC-479A-A5D3-E7B4936A184B}" type="datetimeFigureOut">
               <a:rPr lang="en-GB" smtClean="0"/>
-              <a:t>04/05/2020</a:t>
+              <a:t>07/07/2020</a:t>
             </a:fld>
             <a:endParaRPr lang="en-GB"/>
           </a:p>
@@ -2741,7 +2741,7 @@
           <a:p>
             <a:fld id="{6BA5D40C-A8DC-479A-A5D3-E7B4936A184B}" type="datetimeFigureOut">
               <a:rPr lang="en-GB" smtClean="0"/>
-              <a:t>04/05/2020</a:t>
+              <a:t>07/07/2020</a:t>
             </a:fld>
             <a:endParaRPr lang="en-GB"/>
           </a:p>
@@ -3118,70 +3118,27 @@
       </p:grpSpPr>
       <p:grpSp>
         <p:nvGrpSpPr>
-          <p:cNvPr id="21" name="Group 20">
-            <a:extLst>
-              <a:ext uri="{FF2B5EF4-FFF2-40B4-BE49-F238E27FC236}">
-                <a16:creationId xmlns:a16="http://schemas.microsoft.com/office/drawing/2014/main" id="{65B3F503-0CE7-4899-9B3D-91FDA2D907AD}"/>
-              </a:ext>
-            </a:extLst>
-          </p:cNvPr>
+          <p:cNvPr id="2" name="Group 1"/>
           <p:cNvGrpSpPr/>
           <p:nvPr/>
         </p:nvGrpSpPr>
         <p:grpSpPr>
           <a:xfrm>
-            <a:off x="1471612" y="1374775"/>
-            <a:ext cx="4619625" cy="2581274"/>
-            <a:chOff x="1471612" y="1374775"/>
-            <a:chExt cx="4619625" cy="2581274"/>
+            <a:off x="4082905" y="1809111"/>
+            <a:ext cx="2289319" cy="1686416"/>
+            <a:chOff x="4082905" y="1809111"/>
+            <a:chExt cx="2289319" cy="1686416"/>
           </a:xfrm>
         </p:grpSpPr>
         <p:sp>
           <p:nvSpPr>
-            <p:cNvPr id="3" name="rc3"/>
+            <p:cNvPr id="11" name="tx11"/>
             <p:cNvSpPr/>
             <p:nvPr/>
           </p:nvSpPr>
           <p:spPr>
             <a:xfrm>
-              <a:off x="1471612" y="1374775"/>
-              <a:ext cx="4619625" cy="2581274"/>
-            </a:xfrm>
-            <a:prstGeom prst="rect">
-              <a:avLst/>
-            </a:prstGeom>
-            <a:solidFill>
-              <a:srgbClr val="FFFFFF">
-                <a:alpha val="100000"/>
-              </a:srgbClr>
-            </a:solidFill>
-            <a:ln w="9525" cap="rnd">
-              <a:solidFill>
-                <a:srgbClr val="FFFFFF">
-                  <a:alpha val="100000"/>
-                </a:srgbClr>
-              </a:solidFill>
-              <a:prstDash val="solid"/>
-              <a:round/>
-            </a:ln>
-          </p:spPr>
-          <p:txBody>
-            <a:bodyPr/>
-            <a:lstStyle/>
-            <a:p>
-              <a:endParaRPr dirty="0"/>
-            </a:p>
-          </p:txBody>
-        </p:sp>
-        <p:sp>
-          <p:nvSpPr>
-            <p:cNvPr id="4" name="tx4"/>
-            <p:cNvSpPr/>
-            <p:nvPr/>
-          </p:nvSpPr>
-          <p:spPr>
-            <a:xfrm>
-              <a:off x="2589152" y="1809111"/>
+              <a:off x="4082905" y="1809111"/>
               <a:ext cx="1226740" cy="103410"/>
             </a:xfrm>
             <a:prstGeom prst="rect">
@@ -3221,18 +3178,32 @@
         </p:sp>
         <p:sp>
           <p:nvSpPr>
-            <p:cNvPr id="5" name="pt5"/>
+            <p:cNvPr id="12" name="pt12"/>
             <p:cNvSpPr/>
             <p:nvPr/>
           </p:nvSpPr>
           <p:spPr>
             <a:xfrm>
-              <a:off x="2626627" y="2041023"/>
+              <a:off x="4120380" y="2034285"/>
               <a:ext cx="144506" cy="144506"/>
             </a:xfrm>
             <a:prstGeom prst="ellipse">
               <a:avLst/>
             </a:prstGeom>
+            <a:solidFill>
+              <a:srgbClr val="00B5D1">
+                <a:alpha val="100000"/>
+              </a:srgbClr>
+            </a:solidFill>
+            <a:ln w="9000" cap="rnd">
+              <a:solidFill>
+                <a:srgbClr val="00B5D1">
+                  <a:alpha val="100000"/>
+                </a:srgbClr>
+              </a:solidFill>
+              <a:prstDash val="solid"/>
+              <a:round/>
+            </a:ln>
           </p:spPr>
           <p:txBody>
             <a:bodyPr/>
@@ -3244,13 +3215,13 @@
         </p:sp>
         <p:sp>
           <p:nvSpPr>
-            <p:cNvPr id="6" name="pt6"/>
+            <p:cNvPr id="13" name="pt13"/>
             <p:cNvSpPr/>
             <p:nvPr/>
           </p:nvSpPr>
           <p:spPr>
             <a:xfrm>
-              <a:off x="2626627" y="2260479"/>
+              <a:off x="4120380" y="2253741"/>
               <a:ext cx="144506" cy="144506"/>
             </a:xfrm>
             <a:prstGeom prst="ellipse">
@@ -3281,13 +3252,13 @@
         </p:sp>
         <p:sp>
           <p:nvSpPr>
-            <p:cNvPr id="7" name="pt7"/>
+            <p:cNvPr id="14" name="pt14"/>
             <p:cNvSpPr/>
             <p:nvPr/>
           </p:nvSpPr>
           <p:spPr>
             <a:xfrm>
-              <a:off x="2626627" y="2479935"/>
+              <a:off x="4120380" y="2473197"/>
               <a:ext cx="144506" cy="144506"/>
             </a:xfrm>
             <a:prstGeom prst="ellipse">
@@ -3318,13 +3289,13 @@
         </p:sp>
         <p:sp>
           <p:nvSpPr>
-            <p:cNvPr id="8" name="pt8"/>
+            <p:cNvPr id="15" name="pt15"/>
             <p:cNvSpPr/>
             <p:nvPr/>
           </p:nvSpPr>
           <p:spPr>
             <a:xfrm>
-              <a:off x="2626627" y="2699391"/>
+              <a:off x="4120380" y="2692653"/>
               <a:ext cx="144506" cy="144506"/>
             </a:xfrm>
             <a:prstGeom prst="ellipse">
@@ -3355,13 +3326,13 @@
         </p:sp>
         <p:sp>
           <p:nvSpPr>
-            <p:cNvPr id="9" name="pt9"/>
+            <p:cNvPr id="16" name="pt16"/>
             <p:cNvSpPr/>
             <p:nvPr/>
           </p:nvSpPr>
           <p:spPr>
             <a:xfrm>
-              <a:off x="2626627" y="2918847"/>
+              <a:off x="4120380" y="2912109"/>
               <a:ext cx="144506" cy="144506"/>
             </a:xfrm>
             <a:prstGeom prst="ellipse">
@@ -3392,13 +3363,13 @@
         </p:sp>
         <p:sp>
           <p:nvSpPr>
-            <p:cNvPr id="10" name="pt10"/>
+            <p:cNvPr id="17" name="pt17"/>
             <p:cNvSpPr/>
             <p:nvPr/>
           </p:nvSpPr>
           <p:spPr>
             <a:xfrm>
-              <a:off x="2626627" y="3138303"/>
+              <a:off x="4120380" y="3131565"/>
               <a:ext cx="144506" cy="144506"/>
             </a:xfrm>
             <a:prstGeom prst="ellipse">
@@ -3429,13 +3400,13 @@
         </p:sp>
         <p:sp>
           <p:nvSpPr>
-            <p:cNvPr id="11" name="pt11"/>
+            <p:cNvPr id="18" name="pt18"/>
             <p:cNvSpPr/>
             <p:nvPr/>
           </p:nvSpPr>
           <p:spPr>
             <a:xfrm>
-              <a:off x="2626627" y="3357759"/>
+              <a:off x="4120380" y="3351021"/>
               <a:ext cx="144506" cy="144506"/>
             </a:xfrm>
             <a:prstGeom prst="ellipse">
@@ -3466,13 +3437,13 @@
         </p:sp>
         <p:sp>
           <p:nvSpPr>
-            <p:cNvPr id="12" name="tx12"/>
+            <p:cNvPr id="19" name="tx19"/>
             <p:cNvSpPr/>
             <p:nvPr/>
           </p:nvSpPr>
           <p:spPr>
             <a:xfrm>
-              <a:off x="2878197" y="2048392"/>
+              <a:off x="4371950" y="2041654"/>
               <a:ext cx="956726" cy="104884"/>
             </a:xfrm>
             <a:prstGeom prst="rect">
@@ -3505,20 +3476,20 @@
                   <a:latin typeface="Arial"/>
                   <a:cs typeface="Arial"/>
                 </a:rPr>
-                <a:t>Declared none (44)</a:t>
+                <a:t>Declared none (45)</a:t>
               </a:r>
             </a:p>
           </p:txBody>
         </p:sp>
         <p:sp>
           <p:nvSpPr>
-            <p:cNvPr id="13" name="tx13"/>
+            <p:cNvPr id="20" name="tx20"/>
             <p:cNvSpPr/>
             <p:nvPr/>
           </p:nvSpPr>
           <p:spPr>
             <a:xfrm>
-              <a:off x="2878197" y="2267848"/>
+              <a:off x="4371950" y="2261110"/>
               <a:ext cx="801310" cy="104884"/>
             </a:xfrm>
             <a:prstGeom prst="rect">
@@ -3558,13 +3529,13 @@
         </p:sp>
         <p:sp>
           <p:nvSpPr>
-            <p:cNvPr id="14" name="tx14"/>
+            <p:cNvPr id="21" name="tx21"/>
             <p:cNvSpPr/>
             <p:nvPr/>
           </p:nvSpPr>
           <p:spPr>
             <a:xfrm>
-              <a:off x="2878197" y="2487304"/>
+              <a:off x="4371950" y="2480566"/>
               <a:ext cx="1000055" cy="104884"/>
             </a:xfrm>
             <a:prstGeom prst="rect">
@@ -3588,7 +3559,7 @@
                 </a:spcAft>
               </a:pPr>
               <a:r>
-                <a:rPr sz="880">
+                <a:rPr sz="880" dirty="0">
                   <a:solidFill>
                     <a:srgbClr val="000000">
                       <a:alpha val="100000"/>
@@ -3604,13 +3575,13 @@
         </p:sp>
         <p:sp>
           <p:nvSpPr>
-            <p:cNvPr id="15" name="tx15"/>
+            <p:cNvPr id="22" name="tx22"/>
             <p:cNvSpPr/>
             <p:nvPr/>
           </p:nvSpPr>
           <p:spPr>
             <a:xfrm>
-              <a:off x="2878197" y="2706760"/>
+              <a:off x="4371950" y="2700022"/>
               <a:ext cx="2000274" cy="104884"/>
             </a:xfrm>
             <a:prstGeom prst="rect">
@@ -3634,7 +3605,7 @@
                 </a:spcAft>
               </a:pPr>
               <a:r>
-                <a:rPr sz="880">
+                <a:rPr sz="880" dirty="0">
                   <a:solidFill>
                     <a:srgbClr val="000000">
                       <a:alpha val="100000"/>
@@ -3643,20 +3614,20 @@
                   <a:latin typeface="Arial"/>
                   <a:cs typeface="Arial"/>
                 </a:rPr>
-                <a:t>Both e-cigarrette and pharmaceutical (8)</a:t>
+                <a:t>Both e-cigarette and pharmaceutical (8)</a:t>
               </a:r>
             </a:p>
           </p:txBody>
         </p:sp>
         <p:sp>
           <p:nvSpPr>
-            <p:cNvPr id="16" name="tx16"/>
+            <p:cNvPr id="23" name="tx23"/>
             <p:cNvSpPr/>
             <p:nvPr/>
           </p:nvSpPr>
           <p:spPr>
             <a:xfrm>
-              <a:off x="2878197" y="2926216"/>
+              <a:off x="4371950" y="2919478"/>
               <a:ext cx="708049" cy="104884"/>
             </a:xfrm>
             <a:prstGeom prst="rect">
@@ -3696,13 +3667,13 @@
         </p:sp>
         <p:sp>
           <p:nvSpPr>
-            <p:cNvPr id="17" name="tx17"/>
+            <p:cNvPr id="24" name="tx24"/>
             <p:cNvSpPr/>
             <p:nvPr/>
           </p:nvSpPr>
           <p:spPr>
             <a:xfrm>
-              <a:off x="2878197" y="3145672"/>
+              <a:off x="4371950" y="3138934"/>
               <a:ext cx="1080819" cy="104884"/>
             </a:xfrm>
             <a:prstGeom prst="rect">
@@ -3742,13 +3713,13 @@
         </p:sp>
         <p:sp>
           <p:nvSpPr>
-            <p:cNvPr id="18" name="tx18"/>
+            <p:cNvPr id="25" name="tx25"/>
             <p:cNvSpPr/>
             <p:nvPr/>
           </p:nvSpPr>
           <p:spPr>
             <a:xfrm>
-              <a:off x="2878197" y="3365128"/>
+              <a:off x="4371950" y="3358390"/>
               <a:ext cx="1447422" cy="104884"/>
             </a:xfrm>
             <a:prstGeom prst="rect">
@@ -3787,45 +3758,6 @@
           </p:txBody>
         </p:sp>
       </p:grpSp>
-      <p:sp>
-        <p:nvSpPr>
-          <p:cNvPr id="19" name="pt6">
-            <a:extLst>
-              <a:ext uri="{FF2B5EF4-FFF2-40B4-BE49-F238E27FC236}">
-                <a16:creationId xmlns:a16="http://schemas.microsoft.com/office/drawing/2014/main" id="{4E000B50-4A2A-4486-A328-91341D605EF3}"/>
-              </a:ext>
-            </a:extLst>
-          </p:cNvPr>
-          <p:cNvSpPr/>
-          <p:nvPr/>
-        </p:nvSpPr>
-        <p:spPr>
-          <a:xfrm>
-            <a:off x="2626627" y="2043979"/>
-            <a:ext cx="144506" cy="144506"/>
-          </a:xfrm>
-          <a:prstGeom prst="ellipse">
-            <a:avLst/>
-          </a:prstGeom>
-          <a:solidFill>
-            <a:srgbClr val="00B5D1"/>
-          </a:solidFill>
-          <a:ln w="9000" cap="rnd">
-            <a:solidFill>
-              <a:srgbClr val="00B5D1"/>
-            </a:solidFill>
-            <a:prstDash val="solid"/>
-            <a:round/>
-          </a:ln>
-        </p:spPr>
-        <p:txBody>
-          <a:bodyPr/>
-          <a:lstStyle/>
-          <a:p>
-            <a:endParaRPr/>
-          </a:p>
-        </p:txBody>
-      </p:sp>
     </p:spTree>
   </p:cSld>
   <p:clrMapOvr>

</xml_diff>

<commit_message>
MS updates based on new sample
</commit_message>
<xml_diff>
--- a/outputs/legend_conf_paper.pptx
+++ b/outputs/legend_conf_paper.pptx
@@ -4,8 +4,8 @@
   <p:sldMasterIdLst>
     <p:sldMasterId id="2147483648" r:id="rId1"/>
   </p:sldMasterIdLst>
-  <p:sldIdLst>
-    <p:sldId id="256" r:id="rId2"/>
+  <p:sldIdLst xmlns:a="http://schemas.openxmlformats.org/drawingml/2006/main" xmlns:r="http://schemas.openxmlformats.org/officeDocument/2006/relationships" xmlns:p="http://schemas.openxmlformats.org/presentationml/2006/main">
+    <p:sldId id="256" r:id="rId6"/>
   </p:sldIdLst>
   <p:sldSz cx="7562850" cy="5330825"/>
   <p:notesSz cx="6858000" cy="9144000"/>
@@ -104,22 +104,6 @@
       </a:defRPr>
     </a:lvl9pPr>
   </p:defaultTextStyle>
-  <p:extLst>
-    <p:ext uri="{EFAFB233-063F-42B5-8137-9DF3F51BA10A}">
-      <p15:sldGuideLst xmlns:p15="http://schemas.microsoft.com/office/powerpoint/2012/main">
-        <p15:guide id="1" orient="horz" pos="1679">
-          <p15:clr>
-            <a:srgbClr val="A4A3A4"/>
-          </p15:clr>
-        </p15:guide>
-        <p15:guide id="2" pos="2382">
-          <p15:clr>
-            <a:srgbClr val="A4A3A4"/>
-          </p15:clr>
-        </p15:guide>
-      </p15:sldGuideLst>
-    </p:ext>
-  </p:extLst>
 </p:presentation>
 </file>
 
@@ -161,7 +145,7 @@
           <a:lstStyle/>
           <a:p>
             <a:r>
-              <a:rPr lang="en-US"/>
+              <a:rPr lang="en-US" smtClean="0"/>
               <a:t>Click to edit Master title style</a:t>
             </a:r>
             <a:endParaRPr lang="en-GB"/>
@@ -280,7 +264,7 @@
           </a:lstStyle>
           <a:p>
             <a:r>
-              <a:rPr lang="en-US"/>
+              <a:rPr lang="en-US" smtClean="0"/>
               <a:t>Click to edit Master subtitle style</a:t>
             </a:r>
             <a:endParaRPr lang="en-GB"/>
@@ -304,7 +288,7 @@
           <a:p>
             <a:fld id="{6BA5D40C-A8DC-479A-A5D3-E7B4936A184B}" type="datetimeFigureOut">
               <a:rPr lang="en-GB" smtClean="0"/>
-              <a:t>07/07/2020</a:t>
+              <a:t>15/07/2015</a:t>
             </a:fld>
             <a:endParaRPr lang="en-GB"/>
           </a:p>
@@ -398,7 +382,7 @@
           <a:lstStyle/>
           <a:p>
             <a:r>
-              <a:rPr lang="en-US"/>
+              <a:rPr lang="en-US" smtClean="0"/>
               <a:t>Click to edit Master title style</a:t>
             </a:r>
             <a:endParaRPr lang="en-GB"/>
@@ -422,35 +406,35 @@
           <a:p>
             <a:pPr lvl="0"/>
             <a:r>
-              <a:rPr lang="en-US"/>
+              <a:rPr lang="en-US" smtClean="0"/>
               <a:t>Click to edit Master text styles</a:t>
             </a:r>
           </a:p>
           <a:p>
             <a:pPr lvl="1"/>
             <a:r>
-              <a:rPr lang="en-US"/>
+              <a:rPr lang="en-US" smtClean="0"/>
               <a:t>Second level</a:t>
             </a:r>
           </a:p>
           <a:p>
             <a:pPr lvl="2"/>
             <a:r>
-              <a:rPr lang="en-US"/>
+              <a:rPr lang="en-US" smtClean="0"/>
               <a:t>Third level</a:t>
             </a:r>
           </a:p>
           <a:p>
             <a:pPr lvl="3"/>
             <a:r>
-              <a:rPr lang="en-US"/>
+              <a:rPr lang="en-US" smtClean="0"/>
               <a:t>Fourth level</a:t>
             </a:r>
           </a:p>
           <a:p>
             <a:pPr lvl="4"/>
             <a:r>
-              <a:rPr lang="en-US"/>
+              <a:rPr lang="en-US" smtClean="0"/>
               <a:t>Fifth level</a:t>
             </a:r>
             <a:endParaRPr lang="en-GB"/>
@@ -474,7 +458,7 @@
           <a:p>
             <a:fld id="{6BA5D40C-A8DC-479A-A5D3-E7B4936A184B}" type="datetimeFigureOut">
               <a:rPr lang="en-GB" smtClean="0"/>
-              <a:t>07/07/2020</a:t>
+              <a:t>15/07/2015</a:t>
             </a:fld>
             <a:endParaRPr lang="en-GB"/>
           </a:p>
@@ -573,7 +557,7 @@
           <a:lstStyle/>
           <a:p>
             <a:r>
-              <a:rPr lang="en-US"/>
+              <a:rPr lang="en-US" smtClean="0"/>
               <a:t>Click to edit Master title style</a:t>
             </a:r>
             <a:endParaRPr lang="en-GB"/>
@@ -602,35 +586,35 @@
           <a:p>
             <a:pPr lvl="0"/>
             <a:r>
-              <a:rPr lang="en-US"/>
+              <a:rPr lang="en-US" smtClean="0"/>
               <a:t>Click to edit Master text styles</a:t>
             </a:r>
           </a:p>
           <a:p>
             <a:pPr lvl="1"/>
             <a:r>
-              <a:rPr lang="en-US"/>
+              <a:rPr lang="en-US" smtClean="0"/>
               <a:t>Second level</a:t>
             </a:r>
           </a:p>
           <a:p>
             <a:pPr lvl="2"/>
             <a:r>
-              <a:rPr lang="en-US"/>
+              <a:rPr lang="en-US" smtClean="0"/>
               <a:t>Third level</a:t>
             </a:r>
           </a:p>
           <a:p>
             <a:pPr lvl="3"/>
             <a:r>
-              <a:rPr lang="en-US"/>
+              <a:rPr lang="en-US" smtClean="0"/>
               <a:t>Fourth level</a:t>
             </a:r>
           </a:p>
           <a:p>
             <a:pPr lvl="4"/>
             <a:r>
-              <a:rPr lang="en-US"/>
+              <a:rPr lang="en-US" smtClean="0"/>
               <a:t>Fifth level</a:t>
             </a:r>
             <a:endParaRPr lang="en-GB"/>
@@ -654,7 +638,7 @@
           <a:p>
             <a:fld id="{6BA5D40C-A8DC-479A-A5D3-E7B4936A184B}" type="datetimeFigureOut">
               <a:rPr lang="en-GB" smtClean="0"/>
-              <a:t>07/07/2020</a:t>
+              <a:t>15/07/2015</a:t>
             </a:fld>
             <a:endParaRPr lang="en-GB"/>
           </a:p>
@@ -748,7 +732,7 @@
           <a:lstStyle/>
           <a:p>
             <a:r>
-              <a:rPr lang="en-US"/>
+              <a:rPr lang="en-US" smtClean="0"/>
               <a:t>Click to edit Master title style</a:t>
             </a:r>
             <a:endParaRPr lang="en-GB"/>
@@ -772,35 +756,35 @@
           <a:p>
             <a:pPr lvl="0"/>
             <a:r>
-              <a:rPr lang="en-US"/>
+              <a:rPr lang="en-US" smtClean="0"/>
               <a:t>Click to edit Master text styles</a:t>
             </a:r>
           </a:p>
           <a:p>
             <a:pPr lvl="1"/>
             <a:r>
-              <a:rPr lang="en-US"/>
+              <a:rPr lang="en-US" smtClean="0"/>
               <a:t>Second level</a:t>
             </a:r>
           </a:p>
           <a:p>
             <a:pPr lvl="2"/>
             <a:r>
-              <a:rPr lang="en-US"/>
+              <a:rPr lang="en-US" smtClean="0"/>
               <a:t>Third level</a:t>
             </a:r>
           </a:p>
           <a:p>
             <a:pPr lvl="3"/>
             <a:r>
-              <a:rPr lang="en-US"/>
+              <a:rPr lang="en-US" smtClean="0"/>
               <a:t>Fourth level</a:t>
             </a:r>
           </a:p>
           <a:p>
             <a:pPr lvl="4"/>
             <a:r>
-              <a:rPr lang="en-US"/>
+              <a:rPr lang="en-US" smtClean="0"/>
               <a:t>Fifth level</a:t>
             </a:r>
             <a:endParaRPr lang="en-GB"/>
@@ -824,7 +808,7 @@
           <a:p>
             <a:fld id="{6BA5D40C-A8DC-479A-A5D3-E7B4936A184B}" type="datetimeFigureOut">
               <a:rPr lang="en-GB" smtClean="0"/>
-              <a:t>07/07/2020</a:t>
+              <a:t>15/07/2015</a:t>
             </a:fld>
             <a:endParaRPr lang="en-GB"/>
           </a:p>
@@ -927,7 +911,7 @@
           </a:lstStyle>
           <a:p>
             <a:r>
-              <a:rPr lang="en-US"/>
+              <a:rPr lang="en-US" smtClean="0"/>
               <a:t>Click to edit Master title style</a:t>
             </a:r>
             <a:endParaRPr lang="en-GB"/>
@@ -1047,7 +1031,7 @@
           <a:p>
             <a:pPr lvl="0"/>
             <a:r>
-              <a:rPr lang="en-US"/>
+              <a:rPr lang="en-US" smtClean="0"/>
               <a:t>Click to edit Master text styles</a:t>
             </a:r>
           </a:p>
@@ -1070,7 +1054,7 @@
           <a:p>
             <a:fld id="{6BA5D40C-A8DC-479A-A5D3-E7B4936A184B}" type="datetimeFigureOut">
               <a:rPr lang="en-GB" smtClean="0"/>
-              <a:t>07/07/2020</a:t>
+              <a:t>15/07/2015</a:t>
             </a:fld>
             <a:endParaRPr lang="en-GB"/>
           </a:p>
@@ -1164,7 +1148,7 @@
           <a:lstStyle/>
           <a:p>
             <a:r>
-              <a:rPr lang="en-US"/>
+              <a:rPr lang="en-US" smtClean="0"/>
               <a:t>Click to edit Master title style</a:t>
             </a:r>
             <a:endParaRPr lang="en-GB"/>
@@ -1221,35 +1205,35 @@
           <a:p>
             <a:pPr lvl="0"/>
             <a:r>
-              <a:rPr lang="en-US"/>
+              <a:rPr lang="en-US" smtClean="0"/>
               <a:t>Click to edit Master text styles</a:t>
             </a:r>
           </a:p>
           <a:p>
             <a:pPr lvl="1"/>
             <a:r>
-              <a:rPr lang="en-US"/>
+              <a:rPr lang="en-US" smtClean="0"/>
               <a:t>Second level</a:t>
             </a:r>
           </a:p>
           <a:p>
             <a:pPr lvl="2"/>
             <a:r>
-              <a:rPr lang="en-US"/>
+              <a:rPr lang="en-US" smtClean="0"/>
               <a:t>Third level</a:t>
             </a:r>
           </a:p>
           <a:p>
             <a:pPr lvl="3"/>
             <a:r>
-              <a:rPr lang="en-US"/>
+              <a:rPr lang="en-US" smtClean="0"/>
               <a:t>Fourth level</a:t>
             </a:r>
           </a:p>
           <a:p>
             <a:pPr lvl="4"/>
             <a:r>
-              <a:rPr lang="en-US"/>
+              <a:rPr lang="en-US" smtClean="0"/>
               <a:t>Fifth level</a:t>
             </a:r>
             <a:endParaRPr lang="en-GB"/>
@@ -1306,35 +1290,35 @@
           <a:p>
             <a:pPr lvl="0"/>
             <a:r>
-              <a:rPr lang="en-US"/>
+              <a:rPr lang="en-US" smtClean="0"/>
               <a:t>Click to edit Master text styles</a:t>
             </a:r>
           </a:p>
           <a:p>
             <a:pPr lvl="1"/>
             <a:r>
-              <a:rPr lang="en-US"/>
+              <a:rPr lang="en-US" smtClean="0"/>
               <a:t>Second level</a:t>
             </a:r>
           </a:p>
           <a:p>
             <a:pPr lvl="2"/>
             <a:r>
-              <a:rPr lang="en-US"/>
+              <a:rPr lang="en-US" smtClean="0"/>
               <a:t>Third level</a:t>
             </a:r>
           </a:p>
           <a:p>
             <a:pPr lvl="3"/>
             <a:r>
-              <a:rPr lang="en-US"/>
+              <a:rPr lang="en-US" smtClean="0"/>
               <a:t>Fourth level</a:t>
             </a:r>
           </a:p>
           <a:p>
             <a:pPr lvl="4"/>
             <a:r>
-              <a:rPr lang="en-US"/>
+              <a:rPr lang="en-US" smtClean="0"/>
               <a:t>Fifth level</a:t>
             </a:r>
             <a:endParaRPr lang="en-GB"/>
@@ -1358,7 +1342,7 @@
           <a:p>
             <a:fld id="{6BA5D40C-A8DC-479A-A5D3-E7B4936A184B}" type="datetimeFigureOut">
               <a:rPr lang="en-GB" smtClean="0"/>
-              <a:t>07/07/2020</a:t>
+              <a:t>15/07/2015</a:t>
             </a:fld>
             <a:endParaRPr lang="en-GB"/>
           </a:p>
@@ -1461,7 +1445,7 @@
           </a:lstStyle>
           <a:p>
             <a:r>
-              <a:rPr lang="en-US"/>
+              <a:rPr lang="en-US" smtClean="0"/>
               <a:t>Click to edit Master title style</a:t>
             </a:r>
             <a:endParaRPr lang="en-GB"/>
@@ -1527,7 +1511,7 @@
           <a:p>
             <a:pPr lvl="0"/>
             <a:r>
-              <a:rPr lang="en-US"/>
+              <a:rPr lang="en-US" smtClean="0"/>
               <a:t>Click to edit Master text styles</a:t>
             </a:r>
           </a:p>
@@ -1583,35 +1567,35 @@
           <a:p>
             <a:pPr lvl="0"/>
             <a:r>
-              <a:rPr lang="en-US"/>
+              <a:rPr lang="en-US" smtClean="0"/>
               <a:t>Click to edit Master text styles</a:t>
             </a:r>
           </a:p>
           <a:p>
             <a:pPr lvl="1"/>
             <a:r>
-              <a:rPr lang="en-US"/>
+              <a:rPr lang="en-US" smtClean="0"/>
               <a:t>Second level</a:t>
             </a:r>
           </a:p>
           <a:p>
             <a:pPr lvl="2"/>
             <a:r>
-              <a:rPr lang="en-US"/>
+              <a:rPr lang="en-US" smtClean="0"/>
               <a:t>Third level</a:t>
             </a:r>
           </a:p>
           <a:p>
             <a:pPr lvl="3"/>
             <a:r>
-              <a:rPr lang="en-US"/>
+              <a:rPr lang="en-US" smtClean="0"/>
               <a:t>Fourth level</a:t>
             </a:r>
           </a:p>
           <a:p>
             <a:pPr lvl="4"/>
             <a:r>
-              <a:rPr lang="en-US"/>
+              <a:rPr lang="en-US" smtClean="0"/>
               <a:t>Fifth level</a:t>
             </a:r>
             <a:endParaRPr lang="en-GB"/>
@@ -1677,7 +1661,7 @@
           <a:p>
             <a:pPr lvl="0"/>
             <a:r>
-              <a:rPr lang="en-US"/>
+              <a:rPr lang="en-US" smtClean="0"/>
               <a:t>Click to edit Master text styles</a:t>
             </a:r>
           </a:p>
@@ -1733,35 +1717,35 @@
           <a:p>
             <a:pPr lvl="0"/>
             <a:r>
-              <a:rPr lang="en-US"/>
+              <a:rPr lang="en-US" smtClean="0"/>
               <a:t>Click to edit Master text styles</a:t>
             </a:r>
           </a:p>
           <a:p>
             <a:pPr lvl="1"/>
             <a:r>
-              <a:rPr lang="en-US"/>
+              <a:rPr lang="en-US" smtClean="0"/>
               <a:t>Second level</a:t>
             </a:r>
           </a:p>
           <a:p>
             <a:pPr lvl="2"/>
             <a:r>
-              <a:rPr lang="en-US"/>
+              <a:rPr lang="en-US" smtClean="0"/>
               <a:t>Third level</a:t>
             </a:r>
           </a:p>
           <a:p>
             <a:pPr lvl="3"/>
             <a:r>
-              <a:rPr lang="en-US"/>
+              <a:rPr lang="en-US" smtClean="0"/>
               <a:t>Fourth level</a:t>
             </a:r>
           </a:p>
           <a:p>
             <a:pPr lvl="4"/>
             <a:r>
-              <a:rPr lang="en-US"/>
+              <a:rPr lang="en-US" smtClean="0"/>
               <a:t>Fifth level</a:t>
             </a:r>
             <a:endParaRPr lang="en-GB"/>
@@ -1785,7 +1769,7 @@
           <a:p>
             <a:fld id="{6BA5D40C-A8DC-479A-A5D3-E7B4936A184B}" type="datetimeFigureOut">
               <a:rPr lang="en-GB" smtClean="0"/>
-              <a:t>07/07/2020</a:t>
+              <a:t>15/07/2015</a:t>
             </a:fld>
             <a:endParaRPr lang="en-GB"/>
           </a:p>
@@ -1879,7 +1863,7 @@
           <a:lstStyle/>
           <a:p>
             <a:r>
-              <a:rPr lang="en-US"/>
+              <a:rPr lang="en-US" smtClean="0"/>
               <a:t>Click to edit Master title style</a:t>
             </a:r>
             <a:endParaRPr lang="en-GB"/>
@@ -1903,7 +1887,7 @@
           <a:p>
             <a:fld id="{6BA5D40C-A8DC-479A-A5D3-E7B4936A184B}" type="datetimeFigureOut">
               <a:rPr lang="en-GB" smtClean="0"/>
-              <a:t>07/07/2020</a:t>
+              <a:t>15/07/2015</a:t>
             </a:fld>
             <a:endParaRPr lang="en-GB"/>
           </a:p>
@@ -1998,7 +1982,7 @@
           <a:p>
             <a:fld id="{6BA5D40C-A8DC-479A-A5D3-E7B4936A184B}" type="datetimeFigureOut">
               <a:rPr lang="en-GB" smtClean="0"/>
-              <a:t>07/07/2020</a:t>
+              <a:t>15/07/2015</a:t>
             </a:fld>
             <a:endParaRPr lang="en-GB"/>
           </a:p>
@@ -2101,7 +2085,7 @@
           </a:lstStyle>
           <a:p>
             <a:r>
-              <a:rPr lang="en-US"/>
+              <a:rPr lang="en-US" smtClean="0"/>
               <a:t>Click to edit Master title style</a:t>
             </a:r>
             <a:endParaRPr lang="en-GB"/>
@@ -2158,35 +2142,35 @@
           <a:p>
             <a:pPr lvl="0"/>
             <a:r>
-              <a:rPr lang="en-US"/>
+              <a:rPr lang="en-US" smtClean="0"/>
               <a:t>Click to edit Master text styles</a:t>
             </a:r>
           </a:p>
           <a:p>
             <a:pPr lvl="1"/>
             <a:r>
-              <a:rPr lang="en-US"/>
+              <a:rPr lang="en-US" smtClean="0"/>
               <a:t>Second level</a:t>
             </a:r>
           </a:p>
           <a:p>
             <a:pPr lvl="2"/>
             <a:r>
-              <a:rPr lang="en-US"/>
+              <a:rPr lang="en-US" smtClean="0"/>
               <a:t>Third level</a:t>
             </a:r>
           </a:p>
           <a:p>
             <a:pPr lvl="3"/>
             <a:r>
-              <a:rPr lang="en-US"/>
+              <a:rPr lang="en-US" smtClean="0"/>
               <a:t>Fourth level</a:t>
             </a:r>
           </a:p>
           <a:p>
             <a:pPr lvl="4"/>
             <a:r>
-              <a:rPr lang="en-US"/>
+              <a:rPr lang="en-US" smtClean="0"/>
               <a:t>Fifth level</a:t>
             </a:r>
             <a:endParaRPr lang="en-GB"/>
@@ -2252,7 +2236,7 @@
           <a:p>
             <a:pPr lvl="0"/>
             <a:r>
-              <a:rPr lang="en-US"/>
+              <a:rPr lang="en-US" smtClean="0"/>
               <a:t>Click to edit Master text styles</a:t>
             </a:r>
           </a:p>
@@ -2275,7 +2259,7 @@
           <a:p>
             <a:fld id="{6BA5D40C-A8DC-479A-A5D3-E7B4936A184B}" type="datetimeFigureOut">
               <a:rPr lang="en-GB" smtClean="0"/>
-              <a:t>07/07/2020</a:t>
+              <a:t>15/07/2015</a:t>
             </a:fld>
             <a:endParaRPr lang="en-GB"/>
           </a:p>
@@ -2378,7 +2362,7 @@
           </a:lstStyle>
           <a:p>
             <a:r>
-              <a:rPr lang="en-US"/>
+              <a:rPr lang="en-US" smtClean="0"/>
               <a:t>Click to edit Master title style</a:t>
             </a:r>
             <a:endParaRPr lang="en-GB"/>
@@ -2505,7 +2489,7 @@
           <a:p>
             <a:pPr lvl="0"/>
             <a:r>
-              <a:rPr lang="en-US"/>
+              <a:rPr lang="en-US" smtClean="0"/>
               <a:t>Click to edit Master text styles</a:t>
             </a:r>
           </a:p>
@@ -2528,7 +2512,7 @@
           <a:p>
             <a:fld id="{6BA5D40C-A8DC-479A-A5D3-E7B4936A184B}" type="datetimeFigureOut">
               <a:rPr lang="en-GB" smtClean="0"/>
-              <a:t>07/07/2020</a:t>
+              <a:t>15/07/2015</a:t>
             </a:fld>
             <a:endParaRPr lang="en-GB"/>
           </a:p>
@@ -2637,7 +2621,7 @@
           <a:lstStyle/>
           <a:p>
             <a:r>
-              <a:rPr lang="en-US"/>
+              <a:rPr lang="en-US" smtClean="0"/>
               <a:t>Click to edit Master title style</a:t>
             </a:r>
             <a:endParaRPr lang="en-GB"/>
@@ -2671,35 +2655,35 @@
           <a:p>
             <a:pPr lvl="0"/>
             <a:r>
-              <a:rPr lang="en-US"/>
+              <a:rPr lang="en-US" smtClean="0"/>
               <a:t>Click to edit Master text styles</a:t>
             </a:r>
           </a:p>
           <a:p>
             <a:pPr lvl="1"/>
             <a:r>
-              <a:rPr lang="en-US"/>
+              <a:rPr lang="en-US" smtClean="0"/>
               <a:t>Second level</a:t>
             </a:r>
           </a:p>
           <a:p>
             <a:pPr lvl="2"/>
             <a:r>
-              <a:rPr lang="en-US"/>
+              <a:rPr lang="en-US" smtClean="0"/>
               <a:t>Third level</a:t>
             </a:r>
           </a:p>
           <a:p>
             <a:pPr lvl="3"/>
             <a:r>
-              <a:rPr lang="en-US"/>
+              <a:rPr lang="en-US" smtClean="0"/>
               <a:t>Fourth level</a:t>
             </a:r>
           </a:p>
           <a:p>
             <a:pPr lvl="4"/>
             <a:r>
-              <a:rPr lang="en-US"/>
+              <a:rPr lang="en-US" smtClean="0"/>
               <a:t>Fifth level</a:t>
             </a:r>
             <a:endParaRPr lang="en-GB"/>
@@ -2741,7 +2725,7 @@
           <a:p>
             <a:fld id="{6BA5D40C-A8DC-479A-A5D3-E7B4936A184B}" type="datetimeFigureOut">
               <a:rPr lang="en-GB" smtClean="0"/>
-              <a:t>07/07/2020</a:t>
+              <a:t>15/07/2015</a:t>
             </a:fld>
             <a:endParaRPr lang="en-GB"/>
           </a:p>
@@ -3116,29 +3100,64 @@
           <a:chExt cx="0" cy="0"/>
         </a:xfrm>
       </p:grpSpPr>
-      <p:grpSp>
+      <p:grpSp xmlns:a="http://schemas.openxmlformats.org/drawingml/2006/main" xmlns:r="http://schemas.openxmlformats.org/officeDocument/2006/relationships" xmlns:p="http://schemas.openxmlformats.org/presentationml/2006/main" xmlns:pic="http://schemas.openxmlformats.org/drawingml/2006/picture">
         <p:nvGrpSpPr>
-          <p:cNvPr id="2" name="Group 1"/>
+          <p:cNvPr id="2" name=""/>
           <p:cNvGrpSpPr/>
           <p:nvPr/>
         </p:nvGrpSpPr>
         <p:grpSpPr>
           <a:xfrm>
-            <a:off x="4082905" y="1809111"/>
-            <a:ext cx="2289319" cy="1686416"/>
-            <a:chOff x="4082905" y="1809111"/>
-            <a:chExt cx="2289319" cy="1686416"/>
+            <a:off x="1190625" y="1079500"/>
+            <a:ext cx="5181600" cy="3171825"/>
+            <a:chOff x="1190625" y="1079500"/>
+            <a:chExt cx="5181600" cy="3171825"/>
           </a:xfrm>
         </p:grpSpPr>
         <p:sp>
           <p:nvSpPr>
-            <p:cNvPr id="11" name="tx11"/>
+            <p:cNvPr id="3" name="rc3"/>
             <p:cNvSpPr/>
             <p:nvPr/>
           </p:nvSpPr>
           <p:spPr>
             <a:xfrm>
-              <a:off x="4082905" y="1809111"/>
+              <a:off x="1190625" y="1079499"/>
+              <a:ext cx="5181599" cy="3171825"/>
+            </a:xfrm>
+            <a:prstGeom prst="rect">
+              <a:avLst/>
+            </a:prstGeom>
+            <a:solidFill>
+              <a:srgbClr val="FFFFFF">
+                <a:alpha val="100000"/>
+              </a:srgbClr>
+            </a:solidFill>
+            <a:ln w="9525" cap="rnd">
+              <a:solidFill>
+                <a:srgbClr val="FFFFFF">
+                  <a:alpha val="100000"/>
+                </a:srgbClr>
+              </a:solidFill>
+              <a:prstDash val="solid"/>
+              <a:round/>
+            </a:ln>
+          </p:spPr>
+          <p:txBody>
+            <a:bodyPr/>
+            <a:lstStyle/>
+            <a:p/>
+          </p:txBody>
+        </p:sp>
+        <p:sp>
+          <p:nvSpPr>
+            <p:cNvPr id="4" name="tx4"/>
+            <p:cNvSpPr/>
+            <p:nvPr/>
+          </p:nvSpPr>
+          <p:spPr>
+            <a:xfrm>
+              <a:off x="2589152" y="2028567"/>
               <a:ext cx="1226740" cy="103410"/>
             </a:xfrm>
             <a:prstGeom prst="rect">
@@ -3147,10 +3166,10 @@
             <a:noFill/>
           </p:spPr>
           <p:txBody>
-            <a:bodyPr wrap="none" lIns="0" tIns="0" rIns="0" bIns="0" anchor="ctr" anchorCtr="1"/>
+            <a:bodyPr lIns="0" rIns="0" tIns="0" bIns="0" anchorCtr="1" anchor="ctr" wrap="none"/>
             <a:lstStyle/>
             <a:p>
-              <a:pPr marL="0" marR="0" indent="0" algn="l">
+              <a:pPr algn="l" marL="0" marR="0" indent="0">
                 <a:lnSpc>
                   <a:spcPts val="1100"/>
                 </a:lnSpc>
@@ -3162,7 +3181,7 @@
                 </a:spcAft>
               </a:pPr>
               <a:r>
-                <a:rPr sz="1100" dirty="0">
+                <a:rPr sz="1100">
                   <a:solidFill>
                     <a:srgbClr val="000000">
                       <a:alpha val="100000"/>
@@ -3178,13 +3197,13 @@
         </p:sp>
         <p:sp>
           <p:nvSpPr>
-            <p:cNvPr id="12" name="pt12"/>
+            <p:cNvPr id="5" name="pt5"/>
             <p:cNvSpPr/>
             <p:nvPr/>
           </p:nvSpPr>
           <p:spPr>
             <a:xfrm>
-              <a:off x="4120380" y="2034285"/>
+              <a:off x="2626627" y="2260479"/>
               <a:ext cx="144506" cy="144506"/>
             </a:xfrm>
             <a:prstGeom prst="ellipse">
@@ -3208,20 +3227,18 @@
           <p:txBody>
             <a:bodyPr/>
             <a:lstStyle/>
-            <a:p>
-              <a:endParaRPr/>
-            </a:p>
+            <a:p/>
           </p:txBody>
         </p:sp>
         <p:sp>
           <p:nvSpPr>
-            <p:cNvPr id="13" name="pt13"/>
+            <p:cNvPr id="6" name="pt6"/>
             <p:cNvSpPr/>
             <p:nvPr/>
           </p:nvSpPr>
           <p:spPr>
             <a:xfrm>
-              <a:off x="4120380" y="2253741"/>
+              <a:off x="2626627" y="2479935"/>
               <a:ext cx="144506" cy="144506"/>
             </a:xfrm>
             <a:prstGeom prst="ellipse">
@@ -3245,20 +3262,53 @@
           <p:txBody>
             <a:bodyPr/>
             <a:lstStyle/>
-            <a:p>
-              <a:endParaRPr/>
-            </a:p>
+            <a:p/>
           </p:txBody>
         </p:sp>
         <p:sp>
           <p:nvSpPr>
-            <p:cNvPr id="14" name="pt14"/>
+            <p:cNvPr id="7" name="pt7"/>
             <p:cNvSpPr/>
             <p:nvPr/>
           </p:nvSpPr>
           <p:spPr>
             <a:xfrm>
-              <a:off x="4120380" y="2473197"/>
+              <a:off x="2626627" y="2699391"/>
+              <a:ext cx="144506" cy="144506"/>
+            </a:xfrm>
+            <a:prstGeom prst="ellipse">
+              <a:avLst/>
+            </a:prstGeom>
+            <a:solidFill>
+              <a:srgbClr val="003865">
+                <a:alpha val="100000"/>
+              </a:srgbClr>
+            </a:solidFill>
+            <a:ln w="9000" cap="rnd">
+              <a:solidFill>
+                <a:srgbClr val="003865">
+                  <a:alpha val="100000"/>
+                </a:srgbClr>
+              </a:solidFill>
+              <a:prstDash val="solid"/>
+              <a:round/>
+            </a:ln>
+          </p:spPr>
+          <p:txBody>
+            <a:bodyPr/>
+            <a:lstStyle/>
+            <a:p/>
+          </p:txBody>
+        </p:sp>
+        <p:sp>
+          <p:nvSpPr>
+            <p:cNvPr id="8" name="pt8"/>
+            <p:cNvSpPr/>
+            <p:nvPr/>
+          </p:nvSpPr>
+          <p:spPr>
+            <a:xfrm>
+              <a:off x="2626627" y="2918847"/>
               <a:ext cx="144506" cy="144506"/>
             </a:xfrm>
             <a:prstGeom prst="ellipse">
@@ -3282,57 +3332,18 @@
           <p:txBody>
             <a:bodyPr/>
             <a:lstStyle/>
-            <a:p>
-              <a:endParaRPr/>
-            </a:p>
+            <a:p/>
           </p:txBody>
         </p:sp>
         <p:sp>
           <p:nvSpPr>
-            <p:cNvPr id="15" name="pt15"/>
+            <p:cNvPr id="9" name="pt9"/>
             <p:cNvSpPr/>
             <p:nvPr/>
           </p:nvSpPr>
           <p:spPr>
             <a:xfrm>
-              <a:off x="4120380" y="2692653"/>
-              <a:ext cx="144506" cy="144506"/>
-            </a:xfrm>
-            <a:prstGeom prst="ellipse">
-              <a:avLst/>
-            </a:prstGeom>
-            <a:solidFill>
-              <a:srgbClr val="003865">
-                <a:alpha val="100000"/>
-              </a:srgbClr>
-            </a:solidFill>
-            <a:ln w="9000" cap="rnd">
-              <a:solidFill>
-                <a:srgbClr val="003865">
-                  <a:alpha val="100000"/>
-                </a:srgbClr>
-              </a:solidFill>
-              <a:prstDash val="solid"/>
-              <a:round/>
-            </a:ln>
-          </p:spPr>
-          <p:txBody>
-            <a:bodyPr/>
-            <a:lstStyle/>
-            <a:p>
-              <a:endParaRPr/>
-            </a:p>
-          </p:txBody>
-        </p:sp>
-        <p:sp>
-          <p:nvSpPr>
-            <p:cNvPr id="16" name="pt16"/>
-            <p:cNvSpPr/>
-            <p:nvPr/>
-          </p:nvSpPr>
-          <p:spPr>
-            <a:xfrm>
-              <a:off x="4120380" y="2912109"/>
+              <a:off x="2626627" y="3138303"/>
               <a:ext cx="144506" cy="144506"/>
             </a:xfrm>
             <a:prstGeom prst="ellipse">
@@ -3356,94 +3367,18 @@
           <p:txBody>
             <a:bodyPr/>
             <a:lstStyle/>
-            <a:p>
-              <a:endParaRPr/>
-            </a:p>
+            <a:p/>
           </p:txBody>
         </p:sp>
         <p:sp>
           <p:nvSpPr>
-            <p:cNvPr id="17" name="pt17"/>
+            <p:cNvPr id="10" name="tx10"/>
             <p:cNvSpPr/>
             <p:nvPr/>
           </p:nvSpPr>
           <p:spPr>
             <a:xfrm>
-              <a:off x="4120380" y="3131565"/>
-              <a:ext cx="144506" cy="144506"/>
-            </a:xfrm>
-            <a:prstGeom prst="ellipse">
-              <a:avLst/>
-            </a:prstGeom>
-            <a:solidFill>
-              <a:srgbClr val="951272">
-                <a:alpha val="100000"/>
-              </a:srgbClr>
-            </a:solidFill>
-            <a:ln w="9000" cap="rnd">
-              <a:solidFill>
-                <a:srgbClr val="951272">
-                  <a:alpha val="100000"/>
-                </a:srgbClr>
-              </a:solidFill>
-              <a:prstDash val="solid"/>
-              <a:round/>
-            </a:ln>
-          </p:spPr>
-          <p:txBody>
-            <a:bodyPr/>
-            <a:lstStyle/>
-            <a:p>
-              <a:endParaRPr/>
-            </a:p>
-          </p:txBody>
-        </p:sp>
-        <p:sp>
-          <p:nvSpPr>
-            <p:cNvPr id="18" name="pt18"/>
-            <p:cNvSpPr/>
-            <p:nvPr/>
-          </p:nvSpPr>
-          <p:spPr>
-            <a:xfrm>
-              <a:off x="4120380" y="3351021"/>
-              <a:ext cx="144506" cy="144506"/>
-            </a:xfrm>
-            <a:prstGeom prst="ellipse">
-              <a:avLst/>
-            </a:prstGeom>
-            <a:solidFill>
-              <a:srgbClr val="11DD11">
-                <a:alpha val="100000"/>
-              </a:srgbClr>
-            </a:solidFill>
-            <a:ln w="9000" cap="rnd">
-              <a:solidFill>
-                <a:srgbClr val="11DD11">
-                  <a:alpha val="100000"/>
-                </a:srgbClr>
-              </a:solidFill>
-              <a:prstDash val="solid"/>
-              <a:round/>
-            </a:ln>
-          </p:spPr>
-          <p:txBody>
-            <a:bodyPr/>
-            <a:lstStyle/>
-            <a:p>
-              <a:endParaRPr/>
-            </a:p>
-          </p:txBody>
-        </p:sp>
-        <p:sp>
-          <p:nvSpPr>
-            <p:cNvPr id="19" name="tx19"/>
-            <p:cNvSpPr/>
-            <p:nvPr/>
-          </p:nvSpPr>
-          <p:spPr>
-            <a:xfrm>
-              <a:off x="4371950" y="2041654"/>
+              <a:off x="2878197" y="2267848"/>
               <a:ext cx="956726" cy="104884"/>
             </a:xfrm>
             <a:prstGeom prst="rect">
@@ -3452,10 +3387,10 @@
             <a:noFill/>
           </p:spPr>
           <p:txBody>
-            <a:bodyPr wrap="none" lIns="0" tIns="0" rIns="0" bIns="0" anchor="ctr" anchorCtr="1"/>
+            <a:bodyPr lIns="0" rIns="0" tIns="0" bIns="0" anchorCtr="1" anchor="ctr" wrap="none"/>
             <a:lstStyle/>
             <a:p>
-              <a:pPr marL="0" marR="0" indent="0" algn="l">
+              <a:pPr algn="l" marL="0" marR="0" indent="0">
                 <a:lnSpc>
                   <a:spcPts val="880"/>
                 </a:lnSpc>
@@ -3476,20 +3411,20 @@
                   <a:latin typeface="Arial"/>
                   <a:cs typeface="Arial"/>
                 </a:rPr>
-                <a:t>Declared none (45)</a:t>
+                <a:t>Declared none (27)</a:t>
               </a:r>
             </a:p>
           </p:txBody>
         </p:sp>
         <p:sp>
           <p:nvSpPr>
-            <p:cNvPr id="20" name="tx20"/>
+            <p:cNvPr id="11" name="tx11"/>
             <p:cNvSpPr/>
             <p:nvPr/>
           </p:nvSpPr>
           <p:spPr>
             <a:xfrm>
-              <a:off x="4371950" y="2261110"/>
+              <a:off x="2878197" y="2487304"/>
               <a:ext cx="801310" cy="104884"/>
             </a:xfrm>
             <a:prstGeom prst="rect">
@@ -3498,10 +3433,10 @@
             <a:noFill/>
           </p:spPr>
           <p:txBody>
-            <a:bodyPr wrap="none" lIns="0" tIns="0" rIns="0" bIns="0" anchor="ctr" anchorCtr="1"/>
+            <a:bodyPr lIns="0" rIns="0" tIns="0" bIns="0" anchorCtr="1" anchor="ctr" wrap="none"/>
             <a:lstStyle/>
             <a:p>
-              <a:pPr marL="0" marR="0" indent="0" algn="l">
+              <a:pPr algn="l" marL="0" marR="0" indent="0">
                 <a:lnSpc>
                   <a:spcPts val="880"/>
                 </a:lnSpc>
@@ -3522,66 +3457,20 @@
                   <a:latin typeface="Arial"/>
                   <a:cs typeface="Arial"/>
                 </a:rPr>
-                <a:t>No mention (29)</a:t>
+                <a:t>No mention (14)</a:t>
               </a:r>
             </a:p>
           </p:txBody>
         </p:sp>
         <p:sp>
           <p:nvSpPr>
-            <p:cNvPr id="21" name="tx21"/>
+            <p:cNvPr id="12" name="tx12"/>
             <p:cNvSpPr/>
             <p:nvPr/>
           </p:nvSpPr>
           <p:spPr>
             <a:xfrm>
-              <a:off x="4371950" y="2480566"/>
-              <a:ext cx="1000055" cy="104884"/>
-            </a:xfrm>
-            <a:prstGeom prst="rect">
-              <a:avLst/>
-            </a:prstGeom>
-            <a:noFill/>
-          </p:spPr>
-          <p:txBody>
-            <a:bodyPr wrap="none" lIns="0" tIns="0" rIns="0" bIns="0" anchor="ctr" anchorCtr="1"/>
-            <a:lstStyle/>
-            <a:p>
-              <a:pPr marL="0" marR="0" indent="0" algn="l">
-                <a:lnSpc>
-                  <a:spcPts val="880"/>
-                </a:lnSpc>
-                <a:spcBef>
-                  <a:spcPts val="0"/>
-                </a:spcBef>
-                <a:spcAft>
-                  <a:spcPts val="0"/>
-                </a:spcAft>
-              </a:pPr>
-              <a:r>
-                <a:rPr sz="880" dirty="0">
-                  <a:solidFill>
-                    <a:srgbClr val="000000">
-                      <a:alpha val="100000"/>
-                    </a:srgbClr>
-                  </a:solidFill>
-                  <a:latin typeface="Arial"/>
-                  <a:cs typeface="Arial"/>
-                </a:rPr>
-                <a:t>Pharmaceutical (13)</a:t>
-              </a:r>
-            </a:p>
-          </p:txBody>
-        </p:sp>
-        <p:sp>
-          <p:nvSpPr>
-            <p:cNvPr id="22" name="tx22"/>
-            <p:cNvSpPr/>
-            <p:nvPr/>
-          </p:nvSpPr>
-          <p:spPr>
-            <a:xfrm>
-              <a:off x="4371950" y="2700022"/>
+              <a:off x="2878197" y="2706760"/>
               <a:ext cx="2000274" cy="104884"/>
             </a:xfrm>
             <a:prstGeom prst="rect">
@@ -3590,56 +3479,10 @@
             <a:noFill/>
           </p:spPr>
           <p:txBody>
-            <a:bodyPr wrap="none" lIns="0" tIns="0" rIns="0" bIns="0" anchor="ctr" anchorCtr="1"/>
+            <a:bodyPr lIns="0" rIns="0" tIns="0" bIns="0" anchorCtr="1" anchor="ctr" wrap="none"/>
             <a:lstStyle/>
             <a:p>
-              <a:pPr marL="0" marR="0" indent="0" algn="l">
-                <a:lnSpc>
-                  <a:spcPts val="880"/>
-                </a:lnSpc>
-                <a:spcBef>
-                  <a:spcPts val="0"/>
-                </a:spcBef>
-                <a:spcAft>
-                  <a:spcPts val="0"/>
-                </a:spcAft>
-              </a:pPr>
-              <a:r>
-                <a:rPr sz="880" dirty="0">
-                  <a:solidFill>
-                    <a:srgbClr val="000000">
-                      <a:alpha val="100000"/>
-                    </a:srgbClr>
-                  </a:solidFill>
-                  <a:latin typeface="Arial"/>
-                  <a:cs typeface="Arial"/>
-                </a:rPr>
-                <a:t>Both e-cigarette and pharmaceutical (8)</a:t>
-              </a:r>
-            </a:p>
-          </p:txBody>
-        </p:sp>
-        <p:sp>
-          <p:nvSpPr>
-            <p:cNvPr id="23" name="tx23"/>
-            <p:cNvSpPr/>
-            <p:nvPr/>
-          </p:nvSpPr>
-          <p:spPr>
-            <a:xfrm>
-              <a:off x="4371950" y="2919478"/>
-              <a:ext cx="708049" cy="104884"/>
-            </a:xfrm>
-            <a:prstGeom prst="rect">
-              <a:avLst/>
-            </a:prstGeom>
-            <a:noFill/>
-          </p:spPr>
-          <p:txBody>
-            <a:bodyPr wrap="none" lIns="0" tIns="0" rIns="0" bIns="0" anchor="ctr" anchorCtr="1"/>
-            <a:lstStyle/>
-            <a:p>
-              <a:pPr marL="0" marR="0" indent="0" algn="l">
+              <a:pPr algn="l" marL="0" marR="0" indent="0">
                 <a:lnSpc>
                   <a:spcPts val="880"/>
                 </a:lnSpc>
@@ -3660,21 +3503,21 @@
                   <a:latin typeface="Arial"/>
                   <a:cs typeface="Arial"/>
                 </a:rPr>
-                <a:t>E-cigarette (4)</a:t>
+                <a:t>Both e-cigarrette and pharmaceutical (7)</a:t>
               </a:r>
             </a:p>
           </p:txBody>
         </p:sp>
         <p:sp>
           <p:nvSpPr>
-            <p:cNvPr id="24" name="tx24"/>
+            <p:cNvPr id="13" name="tx13"/>
             <p:cNvSpPr/>
             <p:nvPr/>
           </p:nvSpPr>
           <p:spPr>
             <a:xfrm>
-              <a:off x="4371950" y="3138934"/>
-              <a:ext cx="1080819" cy="104884"/>
+              <a:off x="2878197" y="2926216"/>
+              <a:ext cx="937899" cy="104884"/>
             </a:xfrm>
             <a:prstGeom prst="rect">
               <a:avLst/>
@@ -3682,10 +3525,10 @@
             <a:noFill/>
           </p:spPr>
           <p:txBody>
-            <a:bodyPr wrap="none" lIns="0" tIns="0" rIns="0" bIns="0" anchor="ctr" anchorCtr="1"/>
+            <a:bodyPr lIns="0" rIns="0" tIns="0" bIns="0" anchorCtr="1" anchor="ctr" wrap="none"/>
             <a:lstStyle/>
             <a:p>
-              <a:pPr marL="0" marR="0" indent="0" algn="l">
+              <a:pPr algn="l" marL="0" marR="0" indent="0">
                 <a:lnSpc>
                   <a:spcPts val="880"/>
                 </a:lnSpc>
@@ -3706,21 +3549,21 @@
                   <a:latin typeface="Arial"/>
                   <a:cs typeface="Arial"/>
                 </a:rPr>
-                <a:t>Tobacco company (1)</a:t>
+                <a:t>Pharmaceutical (5)</a:t>
               </a:r>
             </a:p>
           </p:txBody>
         </p:sp>
         <p:sp>
           <p:nvSpPr>
-            <p:cNvPr id="25" name="tx25"/>
+            <p:cNvPr id="14" name="tx14"/>
             <p:cNvSpPr/>
             <p:nvPr/>
           </p:nvSpPr>
           <p:spPr>
             <a:xfrm>
-              <a:off x="4371950" y="3358390"/>
-              <a:ext cx="1447422" cy="104884"/>
+              <a:off x="2878197" y="3145672"/>
+              <a:ext cx="708049" cy="104884"/>
             </a:xfrm>
             <a:prstGeom prst="rect">
               <a:avLst/>
@@ -3728,10 +3571,10 @@
             <a:noFill/>
           </p:spPr>
           <p:txBody>
-            <a:bodyPr wrap="none" lIns="0" tIns="0" rIns="0" bIns="0" anchor="ctr" anchorCtr="1"/>
+            <a:bodyPr lIns="0" rIns="0" tIns="0" bIns="0" anchorCtr="1" anchor="ctr" wrap="none"/>
             <a:lstStyle/>
             <a:p>
-              <a:pPr marL="0" marR="0" indent="0" algn="l">
+              <a:pPr algn="l" marL="0" marR="0" indent="0">
                 <a:lnSpc>
                   <a:spcPts val="880"/>
                 </a:lnSpc>
@@ -3752,7 +3595,7 @@
                   <a:latin typeface="Arial"/>
                   <a:cs typeface="Arial"/>
                 </a:rPr>
-                <a:t>Tobacco control advocate (1)</a:t>
+                <a:t>E-cigarette (1)</a:t>
               </a:r>
             </a:p>
           </p:txBody>

</xml_diff>

<commit_message>
Wills update in PECO
</commit_message>
<xml_diff>
--- a/outputs/legend_conf_paper.pptx
+++ b/outputs/legend_conf_paper.pptx
@@ -3157,7 +3157,7 @@
           </p:nvSpPr>
           <p:spPr>
             <a:xfrm>
-              <a:off x="2589152" y="2028567"/>
+              <a:off x="2589152" y="1809111"/>
               <a:ext cx="1226740" cy="103410"/>
             </a:xfrm>
             <a:prstGeom prst="rect">
@@ -3203,7 +3203,7 @@
           </p:nvSpPr>
           <p:spPr>
             <a:xfrm>
-              <a:off x="2626627" y="2260479"/>
+              <a:off x="2626627" y="2041023"/>
               <a:ext cx="144506" cy="144506"/>
             </a:xfrm>
             <a:prstGeom prst="ellipse">
@@ -3238,7 +3238,7 @@
           </p:nvSpPr>
           <p:spPr>
             <a:xfrm>
-              <a:off x="2626627" y="2479935"/>
+              <a:off x="2626627" y="2260479"/>
               <a:ext cx="144506" cy="144506"/>
             </a:xfrm>
             <a:prstGeom prst="ellipse">
@@ -3273,7 +3273,7 @@
           </p:nvSpPr>
           <p:spPr>
             <a:xfrm>
-              <a:off x="2626627" y="2699391"/>
+              <a:off x="2626627" y="2479935"/>
               <a:ext cx="144506" cy="144506"/>
             </a:xfrm>
             <a:prstGeom prst="ellipse">
@@ -3308,7 +3308,7 @@
           </p:nvSpPr>
           <p:spPr>
             <a:xfrm>
-              <a:off x="2626627" y="2918847"/>
+              <a:off x="2626627" y="2699391"/>
               <a:ext cx="144506" cy="144506"/>
             </a:xfrm>
             <a:prstGeom prst="ellipse">
@@ -3343,7 +3343,7 @@
           </p:nvSpPr>
           <p:spPr>
             <a:xfrm>
-              <a:off x="2626627" y="3138303"/>
+              <a:off x="2626627" y="2918847"/>
               <a:ext cx="144506" cy="144506"/>
             </a:xfrm>
             <a:prstGeom prst="ellipse">
@@ -3372,13 +3372,83 @@
         </p:sp>
         <p:sp>
           <p:nvSpPr>
-            <p:cNvPr id="10" name="tx10"/>
+            <p:cNvPr id="10" name="pt10"/>
             <p:cNvSpPr/>
             <p:nvPr/>
           </p:nvSpPr>
           <p:spPr>
             <a:xfrm>
-              <a:off x="2878197" y="2267848"/>
+              <a:off x="2626627" y="3138303"/>
+              <a:ext cx="144506" cy="144506"/>
+            </a:xfrm>
+            <a:prstGeom prst="ellipse">
+              <a:avLst/>
+            </a:prstGeom>
+            <a:solidFill>
+              <a:srgbClr val="FFB948">
+                <a:alpha val="100000"/>
+              </a:srgbClr>
+            </a:solidFill>
+            <a:ln w="9000" cap="rnd">
+              <a:solidFill>
+                <a:srgbClr val="FFB948">
+                  <a:alpha val="100000"/>
+                </a:srgbClr>
+              </a:solidFill>
+              <a:prstDash val="solid"/>
+              <a:round/>
+            </a:ln>
+          </p:spPr>
+          <p:txBody>
+            <a:bodyPr/>
+            <a:lstStyle/>
+            <a:p/>
+          </p:txBody>
+        </p:sp>
+        <p:sp>
+          <p:nvSpPr>
+            <p:cNvPr id="11" name="pt11"/>
+            <p:cNvSpPr/>
+            <p:nvPr/>
+          </p:nvSpPr>
+          <p:spPr>
+            <a:xfrm>
+              <a:off x="2626627" y="3357759"/>
+              <a:ext cx="144506" cy="144506"/>
+            </a:xfrm>
+            <a:prstGeom prst="ellipse">
+              <a:avLst/>
+            </a:prstGeom>
+            <a:solidFill>
+              <a:srgbClr val="EE11EE">
+                <a:alpha val="100000"/>
+              </a:srgbClr>
+            </a:solidFill>
+            <a:ln w="9000" cap="rnd">
+              <a:solidFill>
+                <a:srgbClr val="EE11EE">
+                  <a:alpha val="100000"/>
+                </a:srgbClr>
+              </a:solidFill>
+              <a:prstDash val="solid"/>
+              <a:round/>
+            </a:ln>
+          </p:spPr>
+          <p:txBody>
+            <a:bodyPr/>
+            <a:lstStyle/>
+            <a:p/>
+          </p:txBody>
+        </p:sp>
+        <p:sp>
+          <p:nvSpPr>
+            <p:cNvPr id="12" name="tx12"/>
+            <p:cNvSpPr/>
+            <p:nvPr/>
+          </p:nvSpPr>
+          <p:spPr>
+            <a:xfrm>
+              <a:off x="2878197" y="2048392"/>
               <a:ext cx="956726" cy="104884"/>
             </a:xfrm>
             <a:prstGeom prst="rect">
@@ -3418,13 +3488,13 @@
         </p:sp>
         <p:sp>
           <p:nvSpPr>
-            <p:cNvPr id="11" name="tx11"/>
+            <p:cNvPr id="13" name="tx13"/>
             <p:cNvSpPr/>
             <p:nvPr/>
           </p:nvSpPr>
           <p:spPr>
             <a:xfrm>
-              <a:off x="2878197" y="2487304"/>
+              <a:off x="2878197" y="2267848"/>
               <a:ext cx="801310" cy="104884"/>
             </a:xfrm>
             <a:prstGeom prst="rect">
@@ -3464,13 +3534,13 @@
         </p:sp>
         <p:sp>
           <p:nvSpPr>
-            <p:cNvPr id="12" name="tx12"/>
+            <p:cNvPr id="14" name="tx14"/>
             <p:cNvSpPr/>
             <p:nvPr/>
           </p:nvSpPr>
           <p:spPr>
             <a:xfrm>
-              <a:off x="2878197" y="2706760"/>
+              <a:off x="2878197" y="2487304"/>
               <a:ext cx="2000274" cy="104884"/>
             </a:xfrm>
             <a:prstGeom prst="rect">
@@ -3510,13 +3580,13 @@
         </p:sp>
         <p:sp>
           <p:nvSpPr>
-            <p:cNvPr id="13" name="tx13"/>
+            <p:cNvPr id="15" name="tx15"/>
             <p:cNvSpPr/>
             <p:nvPr/>
           </p:nvSpPr>
           <p:spPr>
             <a:xfrm>
-              <a:off x="2878197" y="2926216"/>
+              <a:off x="2878197" y="2706760"/>
               <a:ext cx="937899" cy="104884"/>
             </a:xfrm>
             <a:prstGeom prst="rect">
@@ -3556,13 +3626,13 @@
         </p:sp>
         <p:sp>
           <p:nvSpPr>
-            <p:cNvPr id="14" name="tx14"/>
+            <p:cNvPr id="16" name="tx16"/>
             <p:cNvSpPr/>
             <p:nvPr/>
           </p:nvSpPr>
           <p:spPr>
             <a:xfrm>
-              <a:off x="2878197" y="3145672"/>
+              <a:off x="2878197" y="2926216"/>
               <a:ext cx="708049" cy="104884"/>
             </a:xfrm>
             <a:prstGeom prst="rect">
@@ -3596,6 +3666,98 @@
                   <a:cs typeface="Arial"/>
                 </a:rPr>
                 <a:t>E-cigarette (1)</a:t>
+              </a:r>
+            </a:p>
+          </p:txBody>
+        </p:sp>
+        <p:sp>
+          <p:nvSpPr>
+            <p:cNvPr id="17" name="tx17"/>
+            <p:cNvSpPr/>
+            <p:nvPr/>
+          </p:nvSpPr>
+          <p:spPr>
+            <a:xfrm>
+              <a:off x="2878197" y="3145672"/>
+              <a:ext cx="322892" cy="104884"/>
+            </a:xfrm>
+            <a:prstGeom prst="rect">
+              <a:avLst/>
+            </a:prstGeom>
+            <a:noFill/>
+          </p:spPr>
+          <p:txBody>
+            <a:bodyPr lIns="0" rIns="0" tIns="0" bIns="0" anchorCtr="1" anchor="ctr" wrap="none"/>
+            <a:lstStyle/>
+            <a:p>
+              <a:pPr algn="l" marL="0" marR="0" indent="0">
+                <a:lnSpc>
+                  <a:spcPts val="880"/>
+                </a:lnSpc>
+                <a:spcBef>
+                  <a:spcPts val="0"/>
+                </a:spcBef>
+                <a:spcAft>
+                  <a:spcPts val="0"/>
+                </a:spcAft>
+              </a:pPr>
+              <a:r>
+                <a:rPr sz="880">
+                  <a:solidFill>
+                    <a:srgbClr val="000000">
+                      <a:alpha val="100000"/>
+                    </a:srgbClr>
+                  </a:solidFill>
+                  <a:latin typeface="Arial"/>
+                  <a:cs typeface="Arial"/>
+                </a:rPr>
+                <a:t>NA (1)</a:t>
+              </a:r>
+            </a:p>
+          </p:txBody>
+        </p:sp>
+        <p:sp>
+          <p:nvSpPr>
+            <p:cNvPr id="18" name="tx18"/>
+            <p:cNvSpPr/>
+            <p:nvPr/>
+          </p:nvSpPr>
+          <p:spPr>
+            <a:xfrm>
+              <a:off x="2878197" y="3365128"/>
+              <a:ext cx="322892" cy="104884"/>
+            </a:xfrm>
+            <a:prstGeom prst="rect">
+              <a:avLst/>
+            </a:prstGeom>
+            <a:noFill/>
+          </p:spPr>
+          <p:txBody>
+            <a:bodyPr lIns="0" rIns="0" tIns="0" bIns="0" anchorCtr="1" anchor="ctr" wrap="none"/>
+            <a:lstStyle/>
+            <a:p>
+              <a:pPr algn="l" marL="0" marR="0" indent="0">
+                <a:lnSpc>
+                  <a:spcPts val="880"/>
+                </a:lnSpc>
+                <a:spcBef>
+                  <a:spcPts val="0"/>
+                </a:spcBef>
+                <a:spcAft>
+                  <a:spcPts val="0"/>
+                </a:spcAft>
+              </a:pPr>
+              <a:r>
+                <a:rPr sz="880">
+                  <a:solidFill>
+                    <a:srgbClr val="000000">
+                      <a:alpha val="100000"/>
+                    </a:srgbClr>
+                  </a:solidFill>
+                  <a:latin typeface="Arial"/>
+                  <a:cs typeface="Arial"/>
+                </a:rPr>
+                <a:t>NA (1)</a:t>
               </a:r>
             </a:p>
           </p:txBody>

</xml_diff>

<commit_message>
Removal of documents not needed for OSF
</commit_message>
<xml_diff>
--- a/outputs/legend_conf_paper.pptx
+++ b/outputs/legend_conf_paper.pptx
@@ -4,8 +4,8 @@
   <p:sldMasterIdLst>
     <p:sldMasterId id="2147483648" r:id="rId1"/>
   </p:sldMasterIdLst>
-  <p:sldIdLst xmlns:a="http://schemas.openxmlformats.org/drawingml/2006/main" xmlns:r="http://schemas.openxmlformats.org/officeDocument/2006/relationships" xmlns:p="http://schemas.openxmlformats.org/presentationml/2006/main">
-    <p:sldId id="256" r:id="rId6"/>
+  <p:sldIdLst>
+    <p:sldId id="256" r:id="rId2"/>
   </p:sldIdLst>
   <p:sldSz cx="7562850" cy="5330825"/>
   <p:notesSz cx="6858000" cy="9144000"/>
@@ -104,6 +104,22 @@
       </a:defRPr>
     </a:lvl9pPr>
   </p:defaultTextStyle>
+  <p:extLst>
+    <p:ext uri="{EFAFB233-063F-42B5-8137-9DF3F51BA10A}">
+      <p15:sldGuideLst xmlns:p15="http://schemas.microsoft.com/office/powerpoint/2012/main">
+        <p15:guide id="1" orient="horz" pos="1679">
+          <p15:clr>
+            <a:srgbClr val="A4A3A4"/>
+          </p15:clr>
+        </p15:guide>
+        <p15:guide id="2" pos="2382">
+          <p15:clr>
+            <a:srgbClr val="A4A3A4"/>
+          </p15:clr>
+        </p15:guide>
+      </p15:sldGuideLst>
+    </p:ext>
+  </p:extLst>
 </p:presentation>
 </file>
 
@@ -145,7 +161,7 @@
           <a:lstStyle/>
           <a:p>
             <a:r>
-              <a:rPr lang="en-US" smtClean="0"/>
+              <a:rPr lang="en-US"/>
               <a:t>Click to edit Master title style</a:t>
             </a:r>
             <a:endParaRPr lang="en-GB"/>
@@ -264,7 +280,7 @@
           </a:lstStyle>
           <a:p>
             <a:r>
-              <a:rPr lang="en-US" smtClean="0"/>
+              <a:rPr lang="en-US"/>
               <a:t>Click to edit Master subtitle style</a:t>
             </a:r>
             <a:endParaRPr lang="en-GB"/>
@@ -288,7 +304,7 @@
           <a:p>
             <a:fld id="{6BA5D40C-A8DC-479A-A5D3-E7B4936A184B}" type="datetimeFigureOut">
               <a:rPr lang="en-GB" smtClean="0"/>
-              <a:t>15/07/2015</a:t>
+              <a:t>07/12/2020</a:t>
             </a:fld>
             <a:endParaRPr lang="en-GB"/>
           </a:p>
@@ -382,7 +398,7 @@
           <a:lstStyle/>
           <a:p>
             <a:r>
-              <a:rPr lang="en-US" smtClean="0"/>
+              <a:rPr lang="en-US"/>
               <a:t>Click to edit Master title style</a:t>
             </a:r>
             <a:endParaRPr lang="en-GB"/>
@@ -406,35 +422,35 @@
           <a:p>
             <a:pPr lvl="0"/>
             <a:r>
-              <a:rPr lang="en-US" smtClean="0"/>
+              <a:rPr lang="en-US"/>
               <a:t>Click to edit Master text styles</a:t>
             </a:r>
           </a:p>
           <a:p>
             <a:pPr lvl="1"/>
             <a:r>
-              <a:rPr lang="en-US" smtClean="0"/>
+              <a:rPr lang="en-US"/>
               <a:t>Second level</a:t>
             </a:r>
           </a:p>
           <a:p>
             <a:pPr lvl="2"/>
             <a:r>
-              <a:rPr lang="en-US" smtClean="0"/>
+              <a:rPr lang="en-US"/>
               <a:t>Third level</a:t>
             </a:r>
           </a:p>
           <a:p>
             <a:pPr lvl="3"/>
             <a:r>
-              <a:rPr lang="en-US" smtClean="0"/>
+              <a:rPr lang="en-US"/>
               <a:t>Fourth level</a:t>
             </a:r>
           </a:p>
           <a:p>
             <a:pPr lvl="4"/>
             <a:r>
-              <a:rPr lang="en-US" smtClean="0"/>
+              <a:rPr lang="en-US"/>
               <a:t>Fifth level</a:t>
             </a:r>
             <a:endParaRPr lang="en-GB"/>
@@ -458,7 +474,7 @@
           <a:p>
             <a:fld id="{6BA5D40C-A8DC-479A-A5D3-E7B4936A184B}" type="datetimeFigureOut">
               <a:rPr lang="en-GB" smtClean="0"/>
-              <a:t>15/07/2015</a:t>
+              <a:t>07/12/2020</a:t>
             </a:fld>
             <a:endParaRPr lang="en-GB"/>
           </a:p>
@@ -557,7 +573,7 @@
           <a:lstStyle/>
           <a:p>
             <a:r>
-              <a:rPr lang="en-US" smtClean="0"/>
+              <a:rPr lang="en-US"/>
               <a:t>Click to edit Master title style</a:t>
             </a:r>
             <a:endParaRPr lang="en-GB"/>
@@ -586,35 +602,35 @@
           <a:p>
             <a:pPr lvl="0"/>
             <a:r>
-              <a:rPr lang="en-US" smtClean="0"/>
+              <a:rPr lang="en-US"/>
               <a:t>Click to edit Master text styles</a:t>
             </a:r>
           </a:p>
           <a:p>
             <a:pPr lvl="1"/>
             <a:r>
-              <a:rPr lang="en-US" smtClean="0"/>
+              <a:rPr lang="en-US"/>
               <a:t>Second level</a:t>
             </a:r>
           </a:p>
           <a:p>
             <a:pPr lvl="2"/>
             <a:r>
-              <a:rPr lang="en-US" smtClean="0"/>
+              <a:rPr lang="en-US"/>
               <a:t>Third level</a:t>
             </a:r>
           </a:p>
           <a:p>
             <a:pPr lvl="3"/>
             <a:r>
-              <a:rPr lang="en-US" smtClean="0"/>
+              <a:rPr lang="en-US"/>
               <a:t>Fourth level</a:t>
             </a:r>
           </a:p>
           <a:p>
             <a:pPr lvl="4"/>
             <a:r>
-              <a:rPr lang="en-US" smtClean="0"/>
+              <a:rPr lang="en-US"/>
               <a:t>Fifth level</a:t>
             </a:r>
             <a:endParaRPr lang="en-GB"/>
@@ -638,7 +654,7 @@
           <a:p>
             <a:fld id="{6BA5D40C-A8DC-479A-A5D3-E7B4936A184B}" type="datetimeFigureOut">
               <a:rPr lang="en-GB" smtClean="0"/>
-              <a:t>15/07/2015</a:t>
+              <a:t>07/12/2020</a:t>
             </a:fld>
             <a:endParaRPr lang="en-GB"/>
           </a:p>
@@ -732,7 +748,7 @@
           <a:lstStyle/>
           <a:p>
             <a:r>
-              <a:rPr lang="en-US" smtClean="0"/>
+              <a:rPr lang="en-US"/>
               <a:t>Click to edit Master title style</a:t>
             </a:r>
             <a:endParaRPr lang="en-GB"/>
@@ -756,35 +772,35 @@
           <a:p>
             <a:pPr lvl="0"/>
             <a:r>
-              <a:rPr lang="en-US" smtClean="0"/>
+              <a:rPr lang="en-US"/>
               <a:t>Click to edit Master text styles</a:t>
             </a:r>
           </a:p>
           <a:p>
             <a:pPr lvl="1"/>
             <a:r>
-              <a:rPr lang="en-US" smtClean="0"/>
+              <a:rPr lang="en-US"/>
               <a:t>Second level</a:t>
             </a:r>
           </a:p>
           <a:p>
             <a:pPr lvl="2"/>
             <a:r>
-              <a:rPr lang="en-US" smtClean="0"/>
+              <a:rPr lang="en-US"/>
               <a:t>Third level</a:t>
             </a:r>
           </a:p>
           <a:p>
             <a:pPr lvl="3"/>
             <a:r>
-              <a:rPr lang="en-US" smtClean="0"/>
+              <a:rPr lang="en-US"/>
               <a:t>Fourth level</a:t>
             </a:r>
           </a:p>
           <a:p>
             <a:pPr lvl="4"/>
             <a:r>
-              <a:rPr lang="en-US" smtClean="0"/>
+              <a:rPr lang="en-US"/>
               <a:t>Fifth level</a:t>
             </a:r>
             <a:endParaRPr lang="en-GB"/>
@@ -808,7 +824,7 @@
           <a:p>
             <a:fld id="{6BA5D40C-A8DC-479A-A5D3-E7B4936A184B}" type="datetimeFigureOut">
               <a:rPr lang="en-GB" smtClean="0"/>
-              <a:t>15/07/2015</a:t>
+              <a:t>07/12/2020</a:t>
             </a:fld>
             <a:endParaRPr lang="en-GB"/>
           </a:p>
@@ -911,7 +927,7 @@
           </a:lstStyle>
           <a:p>
             <a:r>
-              <a:rPr lang="en-US" smtClean="0"/>
+              <a:rPr lang="en-US"/>
               <a:t>Click to edit Master title style</a:t>
             </a:r>
             <a:endParaRPr lang="en-GB"/>
@@ -1031,7 +1047,7 @@
           <a:p>
             <a:pPr lvl="0"/>
             <a:r>
-              <a:rPr lang="en-US" smtClean="0"/>
+              <a:rPr lang="en-US"/>
               <a:t>Click to edit Master text styles</a:t>
             </a:r>
           </a:p>
@@ -1054,7 +1070,7 @@
           <a:p>
             <a:fld id="{6BA5D40C-A8DC-479A-A5D3-E7B4936A184B}" type="datetimeFigureOut">
               <a:rPr lang="en-GB" smtClean="0"/>
-              <a:t>15/07/2015</a:t>
+              <a:t>07/12/2020</a:t>
             </a:fld>
             <a:endParaRPr lang="en-GB"/>
           </a:p>
@@ -1148,7 +1164,7 @@
           <a:lstStyle/>
           <a:p>
             <a:r>
-              <a:rPr lang="en-US" smtClean="0"/>
+              <a:rPr lang="en-US"/>
               <a:t>Click to edit Master title style</a:t>
             </a:r>
             <a:endParaRPr lang="en-GB"/>
@@ -1205,35 +1221,35 @@
           <a:p>
             <a:pPr lvl="0"/>
             <a:r>
-              <a:rPr lang="en-US" smtClean="0"/>
+              <a:rPr lang="en-US"/>
               <a:t>Click to edit Master text styles</a:t>
             </a:r>
           </a:p>
           <a:p>
             <a:pPr lvl="1"/>
             <a:r>
-              <a:rPr lang="en-US" smtClean="0"/>
+              <a:rPr lang="en-US"/>
               <a:t>Second level</a:t>
             </a:r>
           </a:p>
           <a:p>
             <a:pPr lvl="2"/>
             <a:r>
-              <a:rPr lang="en-US" smtClean="0"/>
+              <a:rPr lang="en-US"/>
               <a:t>Third level</a:t>
             </a:r>
           </a:p>
           <a:p>
             <a:pPr lvl="3"/>
             <a:r>
-              <a:rPr lang="en-US" smtClean="0"/>
+              <a:rPr lang="en-US"/>
               <a:t>Fourth level</a:t>
             </a:r>
           </a:p>
           <a:p>
             <a:pPr lvl="4"/>
             <a:r>
-              <a:rPr lang="en-US" smtClean="0"/>
+              <a:rPr lang="en-US"/>
               <a:t>Fifth level</a:t>
             </a:r>
             <a:endParaRPr lang="en-GB"/>
@@ -1290,35 +1306,35 @@
           <a:p>
             <a:pPr lvl="0"/>
             <a:r>
-              <a:rPr lang="en-US" smtClean="0"/>
+              <a:rPr lang="en-US"/>
               <a:t>Click to edit Master text styles</a:t>
             </a:r>
           </a:p>
           <a:p>
             <a:pPr lvl="1"/>
             <a:r>
-              <a:rPr lang="en-US" smtClean="0"/>
+              <a:rPr lang="en-US"/>
               <a:t>Second level</a:t>
             </a:r>
           </a:p>
           <a:p>
             <a:pPr lvl="2"/>
             <a:r>
-              <a:rPr lang="en-US" smtClean="0"/>
+              <a:rPr lang="en-US"/>
               <a:t>Third level</a:t>
             </a:r>
           </a:p>
           <a:p>
             <a:pPr lvl="3"/>
             <a:r>
-              <a:rPr lang="en-US" smtClean="0"/>
+              <a:rPr lang="en-US"/>
               <a:t>Fourth level</a:t>
             </a:r>
           </a:p>
           <a:p>
             <a:pPr lvl="4"/>
             <a:r>
-              <a:rPr lang="en-US" smtClean="0"/>
+              <a:rPr lang="en-US"/>
               <a:t>Fifth level</a:t>
             </a:r>
             <a:endParaRPr lang="en-GB"/>
@@ -1342,7 +1358,7 @@
           <a:p>
             <a:fld id="{6BA5D40C-A8DC-479A-A5D3-E7B4936A184B}" type="datetimeFigureOut">
               <a:rPr lang="en-GB" smtClean="0"/>
-              <a:t>15/07/2015</a:t>
+              <a:t>07/12/2020</a:t>
             </a:fld>
             <a:endParaRPr lang="en-GB"/>
           </a:p>
@@ -1445,7 +1461,7 @@
           </a:lstStyle>
           <a:p>
             <a:r>
-              <a:rPr lang="en-US" smtClean="0"/>
+              <a:rPr lang="en-US"/>
               <a:t>Click to edit Master title style</a:t>
             </a:r>
             <a:endParaRPr lang="en-GB"/>
@@ -1511,7 +1527,7 @@
           <a:p>
             <a:pPr lvl="0"/>
             <a:r>
-              <a:rPr lang="en-US" smtClean="0"/>
+              <a:rPr lang="en-US"/>
               <a:t>Click to edit Master text styles</a:t>
             </a:r>
           </a:p>
@@ -1567,35 +1583,35 @@
           <a:p>
             <a:pPr lvl="0"/>
             <a:r>
-              <a:rPr lang="en-US" smtClean="0"/>
+              <a:rPr lang="en-US"/>
               <a:t>Click to edit Master text styles</a:t>
             </a:r>
           </a:p>
           <a:p>
             <a:pPr lvl="1"/>
             <a:r>
-              <a:rPr lang="en-US" smtClean="0"/>
+              <a:rPr lang="en-US"/>
               <a:t>Second level</a:t>
             </a:r>
           </a:p>
           <a:p>
             <a:pPr lvl="2"/>
             <a:r>
-              <a:rPr lang="en-US" smtClean="0"/>
+              <a:rPr lang="en-US"/>
               <a:t>Third level</a:t>
             </a:r>
           </a:p>
           <a:p>
             <a:pPr lvl="3"/>
             <a:r>
-              <a:rPr lang="en-US" smtClean="0"/>
+              <a:rPr lang="en-US"/>
               <a:t>Fourth level</a:t>
             </a:r>
           </a:p>
           <a:p>
             <a:pPr lvl="4"/>
             <a:r>
-              <a:rPr lang="en-US" smtClean="0"/>
+              <a:rPr lang="en-US"/>
               <a:t>Fifth level</a:t>
             </a:r>
             <a:endParaRPr lang="en-GB"/>
@@ -1661,7 +1677,7 @@
           <a:p>
             <a:pPr lvl="0"/>
             <a:r>
-              <a:rPr lang="en-US" smtClean="0"/>
+              <a:rPr lang="en-US"/>
               <a:t>Click to edit Master text styles</a:t>
             </a:r>
           </a:p>
@@ -1717,35 +1733,35 @@
           <a:p>
             <a:pPr lvl="0"/>
             <a:r>
-              <a:rPr lang="en-US" smtClean="0"/>
+              <a:rPr lang="en-US"/>
               <a:t>Click to edit Master text styles</a:t>
             </a:r>
           </a:p>
           <a:p>
             <a:pPr lvl="1"/>
             <a:r>
-              <a:rPr lang="en-US" smtClean="0"/>
+              <a:rPr lang="en-US"/>
               <a:t>Second level</a:t>
             </a:r>
           </a:p>
           <a:p>
             <a:pPr lvl="2"/>
             <a:r>
-              <a:rPr lang="en-US" smtClean="0"/>
+              <a:rPr lang="en-US"/>
               <a:t>Third level</a:t>
             </a:r>
           </a:p>
           <a:p>
             <a:pPr lvl="3"/>
             <a:r>
-              <a:rPr lang="en-US" smtClean="0"/>
+              <a:rPr lang="en-US"/>
               <a:t>Fourth level</a:t>
             </a:r>
           </a:p>
           <a:p>
             <a:pPr lvl="4"/>
             <a:r>
-              <a:rPr lang="en-US" smtClean="0"/>
+              <a:rPr lang="en-US"/>
               <a:t>Fifth level</a:t>
             </a:r>
             <a:endParaRPr lang="en-GB"/>
@@ -1769,7 +1785,7 @@
           <a:p>
             <a:fld id="{6BA5D40C-A8DC-479A-A5D3-E7B4936A184B}" type="datetimeFigureOut">
               <a:rPr lang="en-GB" smtClean="0"/>
-              <a:t>15/07/2015</a:t>
+              <a:t>07/12/2020</a:t>
             </a:fld>
             <a:endParaRPr lang="en-GB"/>
           </a:p>
@@ -1863,7 +1879,7 @@
           <a:lstStyle/>
           <a:p>
             <a:r>
-              <a:rPr lang="en-US" smtClean="0"/>
+              <a:rPr lang="en-US"/>
               <a:t>Click to edit Master title style</a:t>
             </a:r>
             <a:endParaRPr lang="en-GB"/>
@@ -1887,7 +1903,7 @@
           <a:p>
             <a:fld id="{6BA5D40C-A8DC-479A-A5D3-E7B4936A184B}" type="datetimeFigureOut">
               <a:rPr lang="en-GB" smtClean="0"/>
-              <a:t>15/07/2015</a:t>
+              <a:t>07/12/2020</a:t>
             </a:fld>
             <a:endParaRPr lang="en-GB"/>
           </a:p>
@@ -1982,7 +1998,7 @@
           <a:p>
             <a:fld id="{6BA5D40C-A8DC-479A-A5D3-E7B4936A184B}" type="datetimeFigureOut">
               <a:rPr lang="en-GB" smtClean="0"/>
-              <a:t>15/07/2015</a:t>
+              <a:t>07/12/2020</a:t>
             </a:fld>
             <a:endParaRPr lang="en-GB"/>
           </a:p>
@@ -2085,7 +2101,7 @@
           </a:lstStyle>
           <a:p>
             <a:r>
-              <a:rPr lang="en-US" smtClean="0"/>
+              <a:rPr lang="en-US"/>
               <a:t>Click to edit Master title style</a:t>
             </a:r>
             <a:endParaRPr lang="en-GB"/>
@@ -2142,35 +2158,35 @@
           <a:p>
             <a:pPr lvl="0"/>
             <a:r>
-              <a:rPr lang="en-US" smtClean="0"/>
+              <a:rPr lang="en-US"/>
               <a:t>Click to edit Master text styles</a:t>
             </a:r>
           </a:p>
           <a:p>
             <a:pPr lvl="1"/>
             <a:r>
-              <a:rPr lang="en-US" smtClean="0"/>
+              <a:rPr lang="en-US"/>
               <a:t>Second level</a:t>
             </a:r>
           </a:p>
           <a:p>
             <a:pPr lvl="2"/>
             <a:r>
-              <a:rPr lang="en-US" smtClean="0"/>
+              <a:rPr lang="en-US"/>
               <a:t>Third level</a:t>
             </a:r>
           </a:p>
           <a:p>
             <a:pPr lvl="3"/>
             <a:r>
-              <a:rPr lang="en-US" smtClean="0"/>
+              <a:rPr lang="en-US"/>
               <a:t>Fourth level</a:t>
             </a:r>
           </a:p>
           <a:p>
             <a:pPr lvl="4"/>
             <a:r>
-              <a:rPr lang="en-US" smtClean="0"/>
+              <a:rPr lang="en-US"/>
               <a:t>Fifth level</a:t>
             </a:r>
             <a:endParaRPr lang="en-GB"/>
@@ -2236,7 +2252,7 @@
           <a:p>
             <a:pPr lvl="0"/>
             <a:r>
-              <a:rPr lang="en-US" smtClean="0"/>
+              <a:rPr lang="en-US"/>
               <a:t>Click to edit Master text styles</a:t>
             </a:r>
           </a:p>
@@ -2259,7 +2275,7 @@
           <a:p>
             <a:fld id="{6BA5D40C-A8DC-479A-A5D3-E7B4936A184B}" type="datetimeFigureOut">
               <a:rPr lang="en-GB" smtClean="0"/>
-              <a:t>15/07/2015</a:t>
+              <a:t>07/12/2020</a:t>
             </a:fld>
             <a:endParaRPr lang="en-GB"/>
           </a:p>
@@ -2362,7 +2378,7 @@
           </a:lstStyle>
           <a:p>
             <a:r>
-              <a:rPr lang="en-US" smtClean="0"/>
+              <a:rPr lang="en-US"/>
               <a:t>Click to edit Master title style</a:t>
             </a:r>
             <a:endParaRPr lang="en-GB"/>
@@ -2489,7 +2505,7 @@
           <a:p>
             <a:pPr lvl="0"/>
             <a:r>
-              <a:rPr lang="en-US" smtClean="0"/>
+              <a:rPr lang="en-US"/>
               <a:t>Click to edit Master text styles</a:t>
             </a:r>
           </a:p>
@@ -2512,7 +2528,7 @@
           <a:p>
             <a:fld id="{6BA5D40C-A8DC-479A-A5D3-E7B4936A184B}" type="datetimeFigureOut">
               <a:rPr lang="en-GB" smtClean="0"/>
-              <a:t>15/07/2015</a:t>
+              <a:t>07/12/2020</a:t>
             </a:fld>
             <a:endParaRPr lang="en-GB"/>
           </a:p>
@@ -2621,7 +2637,7 @@
           <a:lstStyle/>
           <a:p>
             <a:r>
-              <a:rPr lang="en-US" smtClean="0"/>
+              <a:rPr lang="en-US"/>
               <a:t>Click to edit Master title style</a:t>
             </a:r>
             <a:endParaRPr lang="en-GB"/>
@@ -2655,35 +2671,35 @@
           <a:p>
             <a:pPr lvl="0"/>
             <a:r>
-              <a:rPr lang="en-US" smtClean="0"/>
+              <a:rPr lang="en-US"/>
               <a:t>Click to edit Master text styles</a:t>
             </a:r>
           </a:p>
           <a:p>
             <a:pPr lvl="1"/>
             <a:r>
-              <a:rPr lang="en-US" smtClean="0"/>
+              <a:rPr lang="en-US"/>
               <a:t>Second level</a:t>
             </a:r>
           </a:p>
           <a:p>
             <a:pPr lvl="2"/>
             <a:r>
-              <a:rPr lang="en-US" smtClean="0"/>
+              <a:rPr lang="en-US"/>
               <a:t>Third level</a:t>
             </a:r>
           </a:p>
           <a:p>
             <a:pPr lvl="3"/>
             <a:r>
-              <a:rPr lang="en-US" smtClean="0"/>
+              <a:rPr lang="en-US"/>
               <a:t>Fourth level</a:t>
             </a:r>
           </a:p>
           <a:p>
             <a:pPr lvl="4"/>
             <a:r>
-              <a:rPr lang="en-US" smtClean="0"/>
+              <a:rPr lang="en-US"/>
               <a:t>Fifth level</a:t>
             </a:r>
             <a:endParaRPr lang="en-GB"/>
@@ -2725,7 +2741,7 @@
           <a:p>
             <a:fld id="{6BA5D40C-A8DC-479A-A5D3-E7B4936A184B}" type="datetimeFigureOut">
               <a:rPr lang="en-GB" smtClean="0"/>
-              <a:t>15/07/2015</a:t>
+              <a:t>07/12/2020</a:t>
             </a:fld>
             <a:endParaRPr lang="en-GB"/>
           </a:p>
@@ -3100,55 +3116,26 @@
           <a:chExt cx="0" cy="0"/>
         </a:xfrm>
       </p:grpSpPr>
-      <p:grpSp xmlns:a="http://schemas.openxmlformats.org/drawingml/2006/main" xmlns:r="http://schemas.openxmlformats.org/officeDocument/2006/relationships" xmlns:p="http://schemas.openxmlformats.org/presentationml/2006/main" xmlns:pic="http://schemas.openxmlformats.org/drawingml/2006/picture">
+      <p:grpSp>
         <p:nvGrpSpPr>
-          <p:cNvPr id="2" name=""/>
+          <p:cNvPr id="15" name="Group 14">
+            <a:extLst>
+              <a:ext uri="{FF2B5EF4-FFF2-40B4-BE49-F238E27FC236}">
+                <a16:creationId xmlns:a16="http://schemas.microsoft.com/office/drawing/2014/main" id="{DE401E5E-1387-40DE-9571-2AF3F5132F4E}"/>
+              </a:ext>
+            </a:extLst>
+          </p:cNvPr>
           <p:cNvGrpSpPr/>
           <p:nvPr/>
         </p:nvGrpSpPr>
         <p:grpSpPr>
           <a:xfrm>
-            <a:off x="1190625" y="1079500"/>
-            <a:ext cx="5181600" cy="3171825"/>
-            <a:chOff x="1190625" y="1079500"/>
-            <a:chExt cx="5181600" cy="3171825"/>
+            <a:off x="2527454" y="2078443"/>
+            <a:ext cx="2128633" cy="1320155"/>
+            <a:chOff x="2527454" y="2078443"/>
+            <a:chExt cx="2128633" cy="1320155"/>
           </a:xfrm>
         </p:grpSpPr>
-        <p:sp>
-          <p:nvSpPr>
-            <p:cNvPr id="3" name="rc3"/>
-            <p:cNvSpPr/>
-            <p:nvPr/>
-          </p:nvSpPr>
-          <p:spPr>
-            <a:xfrm>
-              <a:off x="1190625" y="1079499"/>
-              <a:ext cx="5181599" cy="3171825"/>
-            </a:xfrm>
-            <a:prstGeom prst="rect">
-              <a:avLst/>
-            </a:prstGeom>
-            <a:solidFill>
-              <a:srgbClr val="FFFFFF">
-                <a:alpha val="100000"/>
-              </a:srgbClr>
-            </a:solidFill>
-            <a:ln w="9525" cap="rnd">
-              <a:solidFill>
-                <a:srgbClr val="FFFFFF">
-                  <a:alpha val="100000"/>
-                </a:srgbClr>
-              </a:solidFill>
-              <a:prstDash val="solid"/>
-              <a:round/>
-            </a:ln>
-          </p:spPr>
-          <p:txBody>
-            <a:bodyPr/>
-            <a:lstStyle/>
-            <a:p/>
-          </p:txBody>
-        </p:sp>
         <p:sp>
           <p:nvSpPr>
             <p:cNvPr id="4" name="tx4"/>
@@ -3157,8 +3144,8 @@
           </p:nvSpPr>
           <p:spPr>
             <a:xfrm>
-              <a:off x="2589152" y="2028567"/>
-              <a:ext cx="1226740" cy="103410"/>
+              <a:off x="2527454" y="2078443"/>
+              <a:ext cx="1172619" cy="108844"/>
             </a:xfrm>
             <a:prstGeom prst="rect">
               <a:avLst/>
@@ -3166,10 +3153,10 @@
             <a:noFill/>
           </p:spPr>
           <p:txBody>
-            <a:bodyPr lIns="0" rIns="0" tIns="0" bIns="0" anchorCtr="1" anchor="ctr" wrap="none"/>
+            <a:bodyPr wrap="none" lIns="0" tIns="0" rIns="0" bIns="0" anchor="ctr" anchorCtr="1"/>
             <a:lstStyle/>
             <a:p>
-              <a:pPr algn="l" marL="0" marR="0" indent="0">
+              <a:pPr marL="0" marR="0" indent="0" algn="l">
                 <a:lnSpc>
                   <a:spcPts val="1100"/>
                 </a:lnSpc>
@@ -3181,14 +3168,14 @@
                 </a:spcAft>
               </a:pPr>
               <a:r>
-                <a:rPr sz="1100">
+                <a:rPr sz="1100" dirty="0">
                   <a:solidFill>
                     <a:srgbClr val="000000">
                       <a:alpha val="100000"/>
                     </a:srgbClr>
                   </a:solidFill>
-                  <a:latin typeface="Arial"/>
-                  <a:cs typeface="Arial"/>
+                  <a:latin typeface="Times New Roman" panose="02020603050405020304" pitchFamily="18" charset="0"/>
+                  <a:cs typeface="Times New Roman" panose="02020603050405020304" pitchFamily="18" charset="0"/>
                 </a:rPr>
                 <a:t>Conflicts of interest:</a:t>
               </a:r>
@@ -3203,8 +3190,8 @@
           </p:nvSpPr>
           <p:spPr>
             <a:xfrm>
-              <a:off x="2626627" y="2260479"/>
-              <a:ext cx="144506" cy="144506"/>
+              <a:off x="2563276" y="2322542"/>
+              <a:ext cx="138131" cy="152100"/>
             </a:xfrm>
             <a:prstGeom prst="ellipse">
               <a:avLst/>
@@ -3227,7 +3214,9 @@
           <p:txBody>
             <a:bodyPr/>
             <a:lstStyle/>
-            <a:p/>
+            <a:p>
+              <a:endParaRPr/>
+            </a:p>
           </p:txBody>
         </p:sp>
         <p:sp>
@@ -3238,8 +3227,8 @@
           </p:nvSpPr>
           <p:spPr>
             <a:xfrm>
-              <a:off x="2626627" y="2479935"/>
-              <a:ext cx="144506" cy="144506"/>
+              <a:off x="2563276" y="2553531"/>
+              <a:ext cx="138131" cy="152100"/>
             </a:xfrm>
             <a:prstGeom prst="ellipse">
               <a:avLst/>
@@ -3262,7 +3251,9 @@
           <p:txBody>
             <a:bodyPr/>
             <a:lstStyle/>
-            <a:p/>
+            <a:p>
+              <a:endParaRPr/>
+            </a:p>
           </p:txBody>
         </p:sp>
         <p:sp>
@@ -3273,8 +3264,8 @@
           </p:nvSpPr>
           <p:spPr>
             <a:xfrm>
-              <a:off x="2626627" y="2699391"/>
-              <a:ext cx="144506" cy="144506"/>
+              <a:off x="2563276" y="2784520"/>
+              <a:ext cx="138131" cy="152100"/>
             </a:xfrm>
             <a:prstGeom prst="ellipse">
               <a:avLst/>
@@ -3297,7 +3288,9 @@
           <p:txBody>
             <a:bodyPr/>
             <a:lstStyle/>
-            <a:p/>
+            <a:p>
+              <a:endParaRPr/>
+            </a:p>
           </p:txBody>
         </p:sp>
         <p:sp>
@@ -3308,8 +3301,8 @@
           </p:nvSpPr>
           <p:spPr>
             <a:xfrm>
-              <a:off x="2626627" y="2918847"/>
-              <a:ext cx="144506" cy="144506"/>
+              <a:off x="2563276" y="3015509"/>
+              <a:ext cx="138131" cy="152100"/>
             </a:xfrm>
             <a:prstGeom prst="ellipse">
               <a:avLst/>
@@ -3332,7 +3325,9 @@
           <p:txBody>
             <a:bodyPr/>
             <a:lstStyle/>
-            <a:p/>
+            <a:p>
+              <a:endParaRPr/>
+            </a:p>
           </p:txBody>
         </p:sp>
         <p:sp>
@@ -3343,8 +3338,8 @@
           </p:nvSpPr>
           <p:spPr>
             <a:xfrm>
-              <a:off x="2626627" y="3138303"/>
-              <a:ext cx="144506" cy="144506"/>
+              <a:off x="2563276" y="3246498"/>
+              <a:ext cx="138131" cy="152100"/>
             </a:xfrm>
             <a:prstGeom prst="ellipse">
               <a:avLst/>
@@ -3367,7 +3362,9 @@
           <p:txBody>
             <a:bodyPr/>
             <a:lstStyle/>
-            <a:p/>
+            <a:p>
+              <a:endParaRPr/>
+            </a:p>
           </p:txBody>
         </p:sp>
         <p:sp>
@@ -3378,8 +3375,8 @@
           </p:nvSpPr>
           <p:spPr>
             <a:xfrm>
-              <a:off x="2878197" y="2267848"/>
-              <a:ext cx="956726" cy="104884"/>
+              <a:off x="2803747" y="2330299"/>
+              <a:ext cx="914518" cy="110396"/>
             </a:xfrm>
             <a:prstGeom prst="rect">
               <a:avLst/>
@@ -3387,10 +3384,10 @@
             <a:noFill/>
           </p:spPr>
           <p:txBody>
-            <a:bodyPr lIns="0" rIns="0" tIns="0" bIns="0" anchorCtr="1" anchor="ctr" wrap="none"/>
+            <a:bodyPr wrap="none" lIns="0" tIns="0" rIns="0" bIns="0" anchor="ctr" anchorCtr="1"/>
             <a:lstStyle/>
             <a:p>
-              <a:pPr algn="l" marL="0" marR="0" indent="0">
+              <a:pPr marL="0" marR="0" indent="0" algn="l">
                 <a:lnSpc>
                   <a:spcPts val="880"/>
                 </a:lnSpc>
@@ -3402,14 +3399,14 @@
                 </a:spcAft>
               </a:pPr>
               <a:r>
-                <a:rPr sz="880">
+                <a:rPr sz="900" dirty="0">
                   <a:solidFill>
                     <a:srgbClr val="000000">
                       <a:alpha val="100000"/>
                     </a:srgbClr>
                   </a:solidFill>
-                  <a:latin typeface="Arial"/>
-                  <a:cs typeface="Arial"/>
+                  <a:latin typeface="Times New Roman" panose="02020603050405020304" pitchFamily="18" charset="0"/>
+                  <a:cs typeface="Times New Roman" panose="02020603050405020304" pitchFamily="18" charset="0"/>
                 </a:rPr>
                 <a:t>Declared none (26)</a:t>
               </a:r>
@@ -3424,8 +3421,8 @@
           </p:nvSpPr>
           <p:spPr>
             <a:xfrm>
-              <a:off x="2878197" y="2487304"/>
-              <a:ext cx="801310" cy="104884"/>
+              <a:off x="2803747" y="2561288"/>
+              <a:ext cx="765958" cy="110396"/>
             </a:xfrm>
             <a:prstGeom prst="rect">
               <a:avLst/>
@@ -3433,10 +3430,10 @@
             <a:noFill/>
           </p:spPr>
           <p:txBody>
-            <a:bodyPr lIns="0" rIns="0" tIns="0" bIns="0" anchorCtr="1" anchor="ctr" wrap="none"/>
+            <a:bodyPr wrap="none" lIns="0" tIns="0" rIns="0" bIns="0" anchor="ctr" anchorCtr="1"/>
             <a:lstStyle/>
             <a:p>
-              <a:pPr algn="l" marL="0" marR="0" indent="0">
+              <a:pPr marL="0" marR="0" indent="0" algn="l">
                 <a:lnSpc>
                   <a:spcPts val="880"/>
                 </a:lnSpc>
@@ -3448,14 +3445,14 @@
                 </a:spcAft>
               </a:pPr>
               <a:r>
-                <a:rPr sz="880">
+                <a:rPr sz="900" dirty="0">
                   <a:solidFill>
                     <a:srgbClr val="000000">
                       <a:alpha val="100000"/>
                     </a:srgbClr>
                   </a:solidFill>
-                  <a:latin typeface="Arial"/>
-                  <a:cs typeface="Arial"/>
+                  <a:latin typeface="Times New Roman" panose="02020603050405020304" pitchFamily="18" charset="0"/>
+                  <a:cs typeface="Times New Roman" panose="02020603050405020304" pitchFamily="18" charset="0"/>
                 </a:rPr>
                 <a:t>No mention (14)</a:t>
               </a:r>
@@ -3470,8 +3467,8 @@
           </p:nvSpPr>
           <p:spPr>
             <a:xfrm>
-              <a:off x="2878197" y="2706760"/>
-              <a:ext cx="2000274" cy="104884"/>
+              <a:off x="2744060" y="2805885"/>
+              <a:ext cx="1912027" cy="110396"/>
             </a:xfrm>
             <a:prstGeom prst="rect">
               <a:avLst/>
@@ -3479,10 +3476,10 @@
             <a:noFill/>
           </p:spPr>
           <p:txBody>
-            <a:bodyPr lIns="0" rIns="0" tIns="0" bIns="0" anchorCtr="1" anchor="ctr" wrap="none"/>
+            <a:bodyPr wrap="none" lIns="0" tIns="0" rIns="0" bIns="0" anchor="ctr" anchorCtr="1"/>
             <a:lstStyle/>
             <a:p>
-              <a:pPr algn="l" marL="0" marR="0" indent="0">
+              <a:pPr marL="0" marR="0" indent="0" algn="l">
                 <a:lnSpc>
                   <a:spcPts val="880"/>
                 </a:lnSpc>
@@ -3494,16 +3491,52 @@
                 </a:spcAft>
               </a:pPr>
               <a:r>
-                <a:rPr sz="880">
+                <a:rPr sz="900" dirty="0">
                   <a:solidFill>
                     <a:srgbClr val="000000">
                       <a:alpha val="100000"/>
                     </a:srgbClr>
                   </a:solidFill>
-                  <a:latin typeface="Arial"/>
-                  <a:cs typeface="Arial"/>
+                  <a:latin typeface="Times New Roman" panose="02020603050405020304" pitchFamily="18" charset="0"/>
+                  <a:cs typeface="Times New Roman" panose="02020603050405020304" pitchFamily="18" charset="0"/>
                 </a:rPr>
-                <a:t>Both e-cigarrette and pharmaceutical (7)</a:t>
+                <a:t>Both e-cigarette</a:t>
+              </a:r>
+              <a:r>
+                <a:rPr lang="en-GB" sz="900">
+                  <a:solidFill>
+                    <a:srgbClr val="000000">
+                      <a:alpha val="100000"/>
+                    </a:srgbClr>
+                  </a:solidFill>
+                  <a:latin typeface="Times New Roman" panose="02020603050405020304" pitchFamily="18" charset="0"/>
+                  <a:cs typeface="Times New Roman" panose="02020603050405020304" pitchFamily="18" charset="0"/>
+                </a:rPr>
+                <a:t> </a:t>
+              </a:r>
+              <a:r>
+                <a:rPr sz="900">
+                  <a:solidFill>
+                    <a:srgbClr val="000000">
+                      <a:alpha val="100000"/>
+                    </a:srgbClr>
+                  </a:solidFill>
+                  <a:latin typeface="Times New Roman" panose="02020603050405020304" pitchFamily="18" charset="0"/>
+                  <a:cs typeface="Times New Roman" panose="02020603050405020304" pitchFamily="18" charset="0"/>
+                </a:rPr>
+                <a:t>and </a:t>
+              </a:r>
+              <a:r>
+                <a:rPr sz="900" dirty="0">
+                  <a:solidFill>
+                    <a:srgbClr val="000000">
+                      <a:alpha val="100000"/>
+                    </a:srgbClr>
+                  </a:solidFill>
+                  <a:latin typeface="Times New Roman" panose="02020603050405020304" pitchFamily="18" charset="0"/>
+                  <a:cs typeface="Times New Roman" panose="02020603050405020304" pitchFamily="18" charset="0"/>
+                </a:rPr>
+                <a:t>pharmaceutical (7)</a:t>
               </a:r>
             </a:p>
           </p:txBody>
@@ -3516,8 +3549,8 @@
           </p:nvSpPr>
           <p:spPr>
             <a:xfrm>
-              <a:off x="2878197" y="2926216"/>
-              <a:ext cx="937899" cy="104884"/>
+              <a:off x="2803747" y="3023265"/>
+              <a:ext cx="896521" cy="110396"/>
             </a:xfrm>
             <a:prstGeom prst="rect">
               <a:avLst/>
@@ -3525,10 +3558,10 @@
             <a:noFill/>
           </p:spPr>
           <p:txBody>
-            <a:bodyPr lIns="0" rIns="0" tIns="0" bIns="0" anchorCtr="1" anchor="ctr" wrap="none"/>
+            <a:bodyPr wrap="none" lIns="0" tIns="0" rIns="0" bIns="0" anchor="ctr" anchorCtr="1"/>
             <a:lstStyle/>
             <a:p>
-              <a:pPr algn="l" marL="0" marR="0" indent="0">
+              <a:pPr marL="0" marR="0" indent="0" algn="l">
                 <a:lnSpc>
                   <a:spcPts val="880"/>
                 </a:lnSpc>
@@ -3540,14 +3573,14 @@
                 </a:spcAft>
               </a:pPr>
               <a:r>
-                <a:rPr sz="880">
+                <a:rPr sz="900">
                   <a:solidFill>
                     <a:srgbClr val="000000">
                       <a:alpha val="100000"/>
                     </a:srgbClr>
                   </a:solidFill>
-                  <a:latin typeface="Arial"/>
-                  <a:cs typeface="Arial"/>
+                  <a:latin typeface="Times New Roman" panose="02020603050405020304" pitchFamily="18" charset="0"/>
+                  <a:cs typeface="Times New Roman" panose="02020603050405020304" pitchFamily="18" charset="0"/>
                 </a:rPr>
                 <a:t>Pharmaceutical (5)</a:t>
               </a:r>
@@ -3562,8 +3595,8 @@
           </p:nvSpPr>
           <p:spPr>
             <a:xfrm>
-              <a:off x="2878197" y="3145672"/>
-              <a:ext cx="708049" cy="104884"/>
+              <a:off x="2803747" y="3254254"/>
+              <a:ext cx="676812" cy="110396"/>
             </a:xfrm>
             <a:prstGeom prst="rect">
               <a:avLst/>
@@ -3571,10 +3604,10 @@
             <a:noFill/>
           </p:spPr>
           <p:txBody>
-            <a:bodyPr lIns="0" rIns="0" tIns="0" bIns="0" anchorCtr="1" anchor="ctr" wrap="none"/>
+            <a:bodyPr wrap="none" lIns="0" tIns="0" rIns="0" bIns="0" anchor="ctr" anchorCtr="1"/>
             <a:lstStyle/>
             <a:p>
-              <a:pPr algn="l" marL="0" marR="0" indent="0">
+              <a:pPr marL="0" marR="0" indent="0" algn="l">
                 <a:lnSpc>
                   <a:spcPts val="880"/>
                 </a:lnSpc>
@@ -3586,14 +3619,14 @@
                 </a:spcAft>
               </a:pPr>
               <a:r>
-                <a:rPr sz="880">
+                <a:rPr sz="900" dirty="0">
                   <a:solidFill>
                     <a:srgbClr val="000000">
                       <a:alpha val="100000"/>
                     </a:srgbClr>
                   </a:solidFill>
-                  <a:latin typeface="Arial"/>
-                  <a:cs typeface="Arial"/>
+                  <a:latin typeface="Times New Roman" panose="02020603050405020304" pitchFamily="18" charset="0"/>
+                  <a:cs typeface="Times New Roman" panose="02020603050405020304" pitchFamily="18" charset="0"/>
                 </a:rPr>
                 <a:t>E-cigarette (1)</a:t>
               </a:r>

</xml_diff>